<commit_message>
Initial draft of the presentation completed. Initial draft of the code fully working.
</commit_message>
<xml_diff>
--- a/FinalPresentation.pptx
+++ b/FinalPresentation.pptx
@@ -4,8 +4,24 @@
   <p:sldMasterIdLst>
     <p:sldMasterId id="2147483660" r:id="rId1"/>
   </p:sldMasterIdLst>
+  <p:notesMasterIdLst>
+    <p:notesMasterId r:id="rId13"/>
+  </p:notesMasterIdLst>
+  <p:handoutMasterIdLst>
+    <p:handoutMasterId r:id="rId14"/>
+  </p:handoutMasterIdLst>
   <p:sldIdLst>
     <p:sldId id="256" r:id="rId2"/>
+    <p:sldId id="265" r:id="rId3"/>
+    <p:sldId id="257" r:id="rId4"/>
+    <p:sldId id="258" r:id="rId5"/>
+    <p:sldId id="259" r:id="rId6"/>
+    <p:sldId id="264" r:id="rId7"/>
+    <p:sldId id="261" r:id="rId8"/>
+    <p:sldId id="262" r:id="rId9"/>
+    <p:sldId id="263" r:id="rId10"/>
+    <p:sldId id="260" r:id="rId11"/>
+    <p:sldId id="266" r:id="rId12"/>
   </p:sldIdLst>
   <p:sldSz cx="9144000" cy="6858000" type="screen4x3"/>
   <p:notesSz cx="6858000" cy="9144000"/>
@@ -107,6 +123,523 @@
 </p:presentation>
 </file>
 
+<file path=ppt/handoutMasters/handoutMaster1.xml><?xml version="1.0" encoding="utf-8"?>
+<p:handoutMaster xmlns:a="http://schemas.openxmlformats.org/drawingml/2006/main" xmlns:r="http://schemas.openxmlformats.org/officeDocument/2006/relationships" xmlns:p="http://schemas.openxmlformats.org/presentationml/2006/main">
+  <p:cSld>
+    <p:bg>
+      <p:bgRef idx="1001">
+        <a:schemeClr val="bg1"/>
+      </p:bgRef>
+    </p:bg>
+    <p:spTree>
+      <p:nvGrpSpPr>
+        <p:cNvPr id="1" name=""/>
+        <p:cNvGrpSpPr/>
+        <p:nvPr/>
+      </p:nvGrpSpPr>
+      <p:grpSpPr>
+        <a:xfrm>
+          <a:off x="0" y="0"/>
+          <a:ext cx="0" cy="0"/>
+          <a:chOff x="0" y="0"/>
+          <a:chExt cx="0" cy="0"/>
+        </a:xfrm>
+      </p:grpSpPr>
+      <p:sp>
+        <p:nvSpPr>
+          <p:cNvPr id="2" name="Header Placeholder 1"/>
+          <p:cNvSpPr>
+            <a:spLocks noGrp="1"/>
+          </p:cNvSpPr>
+          <p:nvPr>
+            <p:ph type="hdr" sz="quarter"/>
+          </p:nvPr>
+        </p:nvSpPr>
+        <p:spPr>
+          <a:xfrm>
+            <a:off x="0" y="0"/>
+            <a:ext cx="2971800" cy="457200"/>
+          </a:xfrm>
+          <a:prstGeom prst="rect">
+            <a:avLst/>
+          </a:prstGeom>
+        </p:spPr>
+        <p:txBody>
+          <a:bodyPr vert="horz" lIns="91440" tIns="45720" rIns="91440" bIns="45720" rtlCol="0"/>
+          <a:lstStyle>
+            <a:lvl1pPr algn="l">
+              <a:defRPr sz="1200"/>
+            </a:lvl1pPr>
+          </a:lstStyle>
+          <a:p>
+            <a:endParaRPr lang="en-US"/>
+          </a:p>
+        </p:txBody>
+      </p:sp>
+      <p:sp>
+        <p:nvSpPr>
+          <p:cNvPr id="3" name="Date Placeholder 2"/>
+          <p:cNvSpPr>
+            <a:spLocks noGrp="1"/>
+          </p:cNvSpPr>
+          <p:nvPr>
+            <p:ph type="dt" sz="quarter" idx="1"/>
+          </p:nvPr>
+        </p:nvSpPr>
+        <p:spPr>
+          <a:xfrm>
+            <a:off x="3884613" y="0"/>
+            <a:ext cx="2971800" cy="457200"/>
+          </a:xfrm>
+          <a:prstGeom prst="rect">
+            <a:avLst/>
+          </a:prstGeom>
+        </p:spPr>
+        <p:txBody>
+          <a:bodyPr vert="horz" lIns="91440" tIns="45720" rIns="91440" bIns="45720" rtlCol="0"/>
+          <a:lstStyle>
+            <a:lvl1pPr algn="r">
+              <a:defRPr sz="1200"/>
+            </a:lvl1pPr>
+          </a:lstStyle>
+          <a:p>
+            <a:fld id="{3F4692F3-3FEA-1449-97AE-0B5AA74E454F}" type="datetimeFigureOut">
+              <a:rPr lang="en-US" smtClean="0"/>
+              <a:t>16/3/16</a:t>
+            </a:fld>
+            <a:endParaRPr lang="en-US"/>
+          </a:p>
+        </p:txBody>
+      </p:sp>
+      <p:sp>
+        <p:nvSpPr>
+          <p:cNvPr id="4" name="Footer Placeholder 3"/>
+          <p:cNvSpPr>
+            <a:spLocks noGrp="1"/>
+          </p:cNvSpPr>
+          <p:nvPr>
+            <p:ph type="ftr" sz="quarter" idx="2"/>
+          </p:nvPr>
+        </p:nvSpPr>
+        <p:spPr>
+          <a:xfrm>
+            <a:off x="0" y="8685213"/>
+            <a:ext cx="2971800" cy="457200"/>
+          </a:xfrm>
+          <a:prstGeom prst="rect">
+            <a:avLst/>
+          </a:prstGeom>
+        </p:spPr>
+        <p:txBody>
+          <a:bodyPr vert="horz" lIns="91440" tIns="45720" rIns="91440" bIns="45720" rtlCol="0" anchor="b"/>
+          <a:lstStyle>
+            <a:lvl1pPr algn="l">
+              <a:defRPr sz="1200"/>
+            </a:lvl1pPr>
+          </a:lstStyle>
+          <a:p>
+            <a:endParaRPr lang="en-US"/>
+          </a:p>
+        </p:txBody>
+      </p:sp>
+      <p:sp>
+        <p:nvSpPr>
+          <p:cNvPr id="5" name="Slide Number Placeholder 4"/>
+          <p:cNvSpPr>
+            <a:spLocks noGrp="1"/>
+          </p:cNvSpPr>
+          <p:nvPr>
+            <p:ph type="sldNum" sz="quarter" idx="3"/>
+          </p:nvPr>
+        </p:nvSpPr>
+        <p:spPr>
+          <a:xfrm>
+            <a:off x="3884613" y="8685213"/>
+            <a:ext cx="2971800" cy="457200"/>
+          </a:xfrm>
+          <a:prstGeom prst="rect">
+            <a:avLst/>
+          </a:prstGeom>
+        </p:spPr>
+        <p:txBody>
+          <a:bodyPr vert="horz" lIns="91440" tIns="45720" rIns="91440" bIns="45720" rtlCol="0" anchor="b"/>
+          <a:lstStyle>
+            <a:lvl1pPr algn="r">
+              <a:defRPr sz="1200"/>
+            </a:lvl1pPr>
+          </a:lstStyle>
+          <a:p>
+            <a:fld id="{A7970C06-35AD-7842-9175-4EFD9C1DAF63}" type="slidenum">
+              <a:rPr lang="en-US" smtClean="0"/>
+              <a:t>‹#›</a:t>
+            </a:fld>
+            <a:endParaRPr lang="en-US"/>
+          </a:p>
+        </p:txBody>
+      </p:sp>
+    </p:spTree>
+    <p:extLst>
+      <p:ext uri="{BB962C8B-B14F-4D97-AF65-F5344CB8AC3E}">
+        <p14:creationId xmlns:p14="http://schemas.microsoft.com/office/powerpoint/2010/main" val="210255204"/>
+      </p:ext>
+    </p:extLst>
+  </p:cSld>
+  <p:clrMap bg1="lt1" tx1="dk1" bg2="lt2" tx2="dk2" accent1="accent1" accent2="accent2" accent3="accent3" accent4="accent4" accent5="accent5" accent6="accent6" hlink="hlink" folHlink="folHlink"/>
+  <p:hf hdr="0" ftr="0" dt="0"/>
+</p:handoutMaster>
+</file>
+
+<file path=ppt/notesMasters/notesMaster1.xml><?xml version="1.0" encoding="utf-8"?>
+<p:notesMaster xmlns:a="http://schemas.openxmlformats.org/drawingml/2006/main" xmlns:r="http://schemas.openxmlformats.org/officeDocument/2006/relationships" xmlns:p="http://schemas.openxmlformats.org/presentationml/2006/main">
+  <p:cSld>
+    <p:bg>
+      <p:bgRef idx="1001">
+        <a:schemeClr val="bg1"/>
+      </p:bgRef>
+    </p:bg>
+    <p:spTree>
+      <p:nvGrpSpPr>
+        <p:cNvPr id="1" name=""/>
+        <p:cNvGrpSpPr/>
+        <p:nvPr/>
+      </p:nvGrpSpPr>
+      <p:grpSpPr>
+        <a:xfrm>
+          <a:off x="0" y="0"/>
+          <a:ext cx="0" cy="0"/>
+          <a:chOff x="0" y="0"/>
+          <a:chExt cx="0" cy="0"/>
+        </a:xfrm>
+      </p:grpSpPr>
+      <p:sp>
+        <p:nvSpPr>
+          <p:cNvPr id="2" name="Header Placeholder 1"/>
+          <p:cNvSpPr>
+            <a:spLocks noGrp="1"/>
+          </p:cNvSpPr>
+          <p:nvPr>
+            <p:ph type="hdr" sz="quarter"/>
+          </p:nvPr>
+        </p:nvSpPr>
+        <p:spPr>
+          <a:xfrm>
+            <a:off x="0" y="0"/>
+            <a:ext cx="2971800" cy="457200"/>
+          </a:xfrm>
+          <a:prstGeom prst="rect">
+            <a:avLst/>
+          </a:prstGeom>
+        </p:spPr>
+        <p:txBody>
+          <a:bodyPr vert="horz" lIns="91440" tIns="45720" rIns="91440" bIns="45720" rtlCol="0"/>
+          <a:lstStyle>
+            <a:lvl1pPr algn="l">
+              <a:defRPr sz="1200"/>
+            </a:lvl1pPr>
+          </a:lstStyle>
+          <a:p>
+            <a:endParaRPr lang="en-US"/>
+          </a:p>
+        </p:txBody>
+      </p:sp>
+      <p:sp>
+        <p:nvSpPr>
+          <p:cNvPr id="3" name="Date Placeholder 2"/>
+          <p:cNvSpPr>
+            <a:spLocks noGrp="1"/>
+          </p:cNvSpPr>
+          <p:nvPr>
+            <p:ph type="dt" idx="1"/>
+          </p:nvPr>
+        </p:nvSpPr>
+        <p:spPr>
+          <a:xfrm>
+            <a:off x="3884613" y="0"/>
+            <a:ext cx="2971800" cy="457200"/>
+          </a:xfrm>
+          <a:prstGeom prst="rect">
+            <a:avLst/>
+          </a:prstGeom>
+        </p:spPr>
+        <p:txBody>
+          <a:bodyPr vert="horz" lIns="91440" tIns="45720" rIns="91440" bIns="45720" rtlCol="0"/>
+          <a:lstStyle>
+            <a:lvl1pPr algn="r">
+              <a:defRPr sz="1200"/>
+            </a:lvl1pPr>
+          </a:lstStyle>
+          <a:p>
+            <a:fld id="{A7A7E92D-2E81-674B-9A4C-1F4E757895E9}" type="datetimeFigureOut">
+              <a:rPr lang="en-US" smtClean="0"/>
+              <a:t>16/3/16</a:t>
+            </a:fld>
+            <a:endParaRPr lang="en-US"/>
+          </a:p>
+        </p:txBody>
+      </p:sp>
+      <p:sp>
+        <p:nvSpPr>
+          <p:cNvPr id="4" name="Slide Image Placeholder 3"/>
+          <p:cNvSpPr>
+            <a:spLocks noGrp="1" noRot="1" noChangeAspect="1"/>
+          </p:cNvSpPr>
+          <p:nvPr>
+            <p:ph type="sldImg" idx="2"/>
+          </p:nvPr>
+        </p:nvSpPr>
+        <p:spPr>
+          <a:xfrm>
+            <a:off x="1143000" y="685800"/>
+            <a:ext cx="4572000" cy="3429000"/>
+          </a:xfrm>
+          <a:prstGeom prst="rect">
+            <a:avLst/>
+          </a:prstGeom>
+          <a:noFill/>
+          <a:ln w="12700">
+            <a:solidFill>
+              <a:prstClr val="black"/>
+            </a:solidFill>
+          </a:ln>
+        </p:spPr>
+        <p:txBody>
+          <a:bodyPr vert="horz" lIns="91440" tIns="45720" rIns="91440" bIns="45720" rtlCol="0" anchor="ctr"/>
+          <a:lstStyle/>
+          <a:p>
+            <a:endParaRPr lang="en-US"/>
+          </a:p>
+        </p:txBody>
+      </p:sp>
+      <p:sp>
+        <p:nvSpPr>
+          <p:cNvPr id="5" name="Notes Placeholder 4"/>
+          <p:cNvSpPr>
+            <a:spLocks noGrp="1"/>
+          </p:cNvSpPr>
+          <p:nvPr>
+            <p:ph type="body" sz="quarter" idx="3"/>
+          </p:nvPr>
+        </p:nvSpPr>
+        <p:spPr>
+          <a:xfrm>
+            <a:off x="685800" y="4343400"/>
+            <a:ext cx="5486400" cy="4114800"/>
+          </a:xfrm>
+          <a:prstGeom prst="rect">
+            <a:avLst/>
+          </a:prstGeom>
+        </p:spPr>
+        <p:txBody>
+          <a:bodyPr vert="horz" lIns="91440" tIns="45720" rIns="91440" bIns="45720" rtlCol="0"/>
+          <a:lstStyle/>
+          <a:p>
+            <a:pPr lvl="0"/>
+            <a:r>
+              <a:rPr lang="pl-PL" smtClean="0"/>
+              <a:t>Click to edit Master text styles</a:t>
+            </a:r>
+          </a:p>
+          <a:p>
+            <a:pPr lvl="1"/>
+            <a:r>
+              <a:rPr lang="pl-PL" smtClean="0"/>
+              <a:t>Second level</a:t>
+            </a:r>
+          </a:p>
+          <a:p>
+            <a:pPr lvl="2"/>
+            <a:r>
+              <a:rPr lang="pl-PL" smtClean="0"/>
+              <a:t>Third level</a:t>
+            </a:r>
+          </a:p>
+          <a:p>
+            <a:pPr lvl="3"/>
+            <a:r>
+              <a:rPr lang="pl-PL" smtClean="0"/>
+              <a:t>Fourth level</a:t>
+            </a:r>
+          </a:p>
+          <a:p>
+            <a:pPr lvl="4"/>
+            <a:r>
+              <a:rPr lang="pl-PL" smtClean="0"/>
+              <a:t>Fifth level</a:t>
+            </a:r>
+            <a:endParaRPr lang="en-US"/>
+          </a:p>
+        </p:txBody>
+      </p:sp>
+      <p:sp>
+        <p:nvSpPr>
+          <p:cNvPr id="6" name="Footer Placeholder 5"/>
+          <p:cNvSpPr>
+            <a:spLocks noGrp="1"/>
+          </p:cNvSpPr>
+          <p:nvPr>
+            <p:ph type="ftr" sz="quarter" idx="4"/>
+          </p:nvPr>
+        </p:nvSpPr>
+        <p:spPr>
+          <a:xfrm>
+            <a:off x="0" y="8685213"/>
+            <a:ext cx="2971800" cy="457200"/>
+          </a:xfrm>
+          <a:prstGeom prst="rect">
+            <a:avLst/>
+          </a:prstGeom>
+        </p:spPr>
+        <p:txBody>
+          <a:bodyPr vert="horz" lIns="91440" tIns="45720" rIns="91440" bIns="45720" rtlCol="0" anchor="b"/>
+          <a:lstStyle>
+            <a:lvl1pPr algn="l">
+              <a:defRPr sz="1200"/>
+            </a:lvl1pPr>
+          </a:lstStyle>
+          <a:p>
+            <a:endParaRPr lang="en-US"/>
+          </a:p>
+        </p:txBody>
+      </p:sp>
+      <p:sp>
+        <p:nvSpPr>
+          <p:cNvPr id="7" name="Slide Number Placeholder 6"/>
+          <p:cNvSpPr>
+            <a:spLocks noGrp="1"/>
+          </p:cNvSpPr>
+          <p:nvPr>
+            <p:ph type="sldNum" sz="quarter" idx="5"/>
+          </p:nvPr>
+        </p:nvSpPr>
+        <p:spPr>
+          <a:xfrm>
+            <a:off x="3884613" y="8685213"/>
+            <a:ext cx="2971800" cy="457200"/>
+          </a:xfrm>
+          <a:prstGeom prst="rect">
+            <a:avLst/>
+          </a:prstGeom>
+        </p:spPr>
+        <p:txBody>
+          <a:bodyPr vert="horz" lIns="91440" tIns="45720" rIns="91440" bIns="45720" rtlCol="0" anchor="b"/>
+          <a:lstStyle>
+            <a:lvl1pPr algn="r">
+              <a:defRPr sz="1200"/>
+            </a:lvl1pPr>
+          </a:lstStyle>
+          <a:p>
+            <a:fld id="{51789006-7912-3D49-9AC1-993ED41A3C09}" type="slidenum">
+              <a:rPr lang="en-US" smtClean="0"/>
+              <a:t>‹#›</a:t>
+            </a:fld>
+            <a:endParaRPr lang="en-US"/>
+          </a:p>
+        </p:txBody>
+      </p:sp>
+    </p:spTree>
+    <p:extLst>
+      <p:ext uri="{BB962C8B-B14F-4D97-AF65-F5344CB8AC3E}">
+        <p14:creationId xmlns:p14="http://schemas.microsoft.com/office/powerpoint/2010/main" val="2254358759"/>
+      </p:ext>
+    </p:extLst>
+  </p:cSld>
+  <p:clrMap bg1="lt1" tx1="dk1" bg2="lt2" tx2="dk2" accent1="accent1" accent2="accent2" accent3="accent3" accent4="accent4" accent5="accent5" accent6="accent6" hlink="hlink" folHlink="folHlink"/>
+  <p:hf hdr="0" ftr="0" dt="0"/>
+  <p:notesStyle>
+    <a:lvl1pPr marL="0" algn="l" defTabSz="457200" rtl="0" eaLnBrk="1" latinLnBrk="0" hangingPunct="1">
+      <a:defRPr sz="1200" kern="1200">
+        <a:solidFill>
+          <a:schemeClr val="tx1"/>
+        </a:solidFill>
+        <a:latin typeface="+mn-lt"/>
+        <a:ea typeface="+mn-ea"/>
+        <a:cs typeface="+mn-cs"/>
+      </a:defRPr>
+    </a:lvl1pPr>
+    <a:lvl2pPr marL="457200" algn="l" defTabSz="457200" rtl="0" eaLnBrk="1" latinLnBrk="0" hangingPunct="1">
+      <a:defRPr sz="1200" kern="1200">
+        <a:solidFill>
+          <a:schemeClr val="tx1"/>
+        </a:solidFill>
+        <a:latin typeface="+mn-lt"/>
+        <a:ea typeface="+mn-ea"/>
+        <a:cs typeface="+mn-cs"/>
+      </a:defRPr>
+    </a:lvl2pPr>
+    <a:lvl3pPr marL="914400" algn="l" defTabSz="457200" rtl="0" eaLnBrk="1" latinLnBrk="0" hangingPunct="1">
+      <a:defRPr sz="1200" kern="1200">
+        <a:solidFill>
+          <a:schemeClr val="tx1"/>
+        </a:solidFill>
+        <a:latin typeface="+mn-lt"/>
+        <a:ea typeface="+mn-ea"/>
+        <a:cs typeface="+mn-cs"/>
+      </a:defRPr>
+    </a:lvl3pPr>
+    <a:lvl4pPr marL="1371600" algn="l" defTabSz="457200" rtl="0" eaLnBrk="1" latinLnBrk="0" hangingPunct="1">
+      <a:defRPr sz="1200" kern="1200">
+        <a:solidFill>
+          <a:schemeClr val="tx1"/>
+        </a:solidFill>
+        <a:latin typeface="+mn-lt"/>
+        <a:ea typeface="+mn-ea"/>
+        <a:cs typeface="+mn-cs"/>
+      </a:defRPr>
+    </a:lvl4pPr>
+    <a:lvl5pPr marL="1828800" algn="l" defTabSz="457200" rtl="0" eaLnBrk="1" latinLnBrk="0" hangingPunct="1">
+      <a:defRPr sz="1200" kern="1200">
+        <a:solidFill>
+          <a:schemeClr val="tx1"/>
+        </a:solidFill>
+        <a:latin typeface="+mn-lt"/>
+        <a:ea typeface="+mn-ea"/>
+        <a:cs typeface="+mn-cs"/>
+      </a:defRPr>
+    </a:lvl5pPr>
+    <a:lvl6pPr marL="2286000" algn="l" defTabSz="457200" rtl="0" eaLnBrk="1" latinLnBrk="0" hangingPunct="1">
+      <a:defRPr sz="1200" kern="1200">
+        <a:solidFill>
+          <a:schemeClr val="tx1"/>
+        </a:solidFill>
+        <a:latin typeface="+mn-lt"/>
+        <a:ea typeface="+mn-ea"/>
+        <a:cs typeface="+mn-cs"/>
+      </a:defRPr>
+    </a:lvl6pPr>
+    <a:lvl7pPr marL="2743200" algn="l" defTabSz="457200" rtl="0" eaLnBrk="1" latinLnBrk="0" hangingPunct="1">
+      <a:defRPr sz="1200" kern="1200">
+        <a:solidFill>
+          <a:schemeClr val="tx1"/>
+        </a:solidFill>
+        <a:latin typeface="+mn-lt"/>
+        <a:ea typeface="+mn-ea"/>
+        <a:cs typeface="+mn-cs"/>
+      </a:defRPr>
+    </a:lvl7pPr>
+    <a:lvl8pPr marL="3200400" algn="l" defTabSz="457200" rtl="0" eaLnBrk="1" latinLnBrk="0" hangingPunct="1">
+      <a:defRPr sz="1200" kern="1200">
+        <a:solidFill>
+          <a:schemeClr val="tx1"/>
+        </a:solidFill>
+        <a:latin typeface="+mn-lt"/>
+        <a:ea typeface="+mn-ea"/>
+        <a:cs typeface="+mn-cs"/>
+      </a:defRPr>
+    </a:lvl8pPr>
+    <a:lvl9pPr marL="3657600" algn="l" defTabSz="457200" rtl="0" eaLnBrk="1" latinLnBrk="0" hangingPunct="1">
+      <a:defRPr sz="1200" kern="1200">
+        <a:solidFill>
+          <a:schemeClr val="tx1"/>
+        </a:solidFill>
+        <a:latin typeface="+mn-lt"/>
+        <a:ea typeface="+mn-ea"/>
+        <a:cs typeface="+mn-cs"/>
+      </a:defRPr>
+    </a:lvl9pPr>
+  </p:notesStyle>
+</p:notesMaster>
+</file>
+
 <file path=ppt/slideLayouts/slideLayout1.xml><?xml version="1.0" encoding="utf-8"?>
 <p:sldLayout xmlns:a="http://schemas.openxmlformats.org/drawingml/2006/main" xmlns:r="http://schemas.openxmlformats.org/officeDocument/2006/relationships" xmlns:p="http://schemas.openxmlformats.org/presentationml/2006/main" preserve="1">
   <p:cSld name="Titelfolie A">
@@ -230,10 +763,10 @@
             </a:lvl1pPr>
           </a:lstStyle>
           <a:p>
-            <a:fld id="{85281AA8-C4BE-BE48-9FDE-FFCDCC15F285}" type="datetimeFigureOut">
-              <a:rPr lang="en-US" smtClean="0"/>
-              <a:t>16/3/16</a:t>
-            </a:fld>
+            <a:r>
+              <a:rPr lang="pl-PL" smtClean="0"/>
+              <a:t>18/03/2016</a:t>
+            </a:r>
             <a:endParaRPr lang="en-US"/>
           </a:p>
         </p:txBody>
@@ -262,6 +795,10 @@
             </a:lvl1pPr>
           </a:lstStyle>
           <a:p>
+            <a:r>
+              <a:rPr lang="en-US" smtClean="0"/>
+              <a:t>Mateusz Iwo Dubaniowski</a:t>
+            </a:r>
             <a:endParaRPr lang="en-US"/>
           </a:p>
         </p:txBody>
@@ -599,10 +1136,10 @@
             </a:lvl1pPr>
           </a:lstStyle>
           <a:p>
-            <a:fld id="{85281AA8-C4BE-BE48-9FDE-FFCDCC15F285}" type="datetimeFigureOut">
-              <a:rPr lang="en-US" smtClean="0"/>
-              <a:t>16/3/16</a:t>
-            </a:fld>
+            <a:r>
+              <a:rPr lang="pl-PL" smtClean="0"/>
+              <a:t>18/03/2016</a:t>
+            </a:r>
             <a:endParaRPr lang="en-US"/>
           </a:p>
         </p:txBody>
@@ -631,6 +1168,10 @@
             </a:lvl1pPr>
           </a:lstStyle>
           <a:p>
+            <a:r>
+              <a:rPr lang="en-US" smtClean="0"/>
+              <a:t>Mateusz Iwo Dubaniowski</a:t>
+            </a:r>
             <a:endParaRPr lang="en-US"/>
           </a:p>
         </p:txBody>
@@ -940,10 +1481,10 @@
             </a:lvl1pPr>
           </a:lstStyle>
           <a:p>
-            <a:fld id="{85281AA8-C4BE-BE48-9FDE-FFCDCC15F285}" type="datetimeFigureOut">
-              <a:rPr lang="en-US" smtClean="0"/>
-              <a:t>16/3/16</a:t>
-            </a:fld>
+            <a:r>
+              <a:rPr lang="pl-PL" smtClean="0"/>
+              <a:t>18/03/2016</a:t>
+            </a:r>
             <a:endParaRPr lang="en-US"/>
           </a:p>
         </p:txBody>
@@ -972,6 +1513,10 @@
             </a:lvl1pPr>
           </a:lstStyle>
           <a:p>
+            <a:r>
+              <a:rPr lang="en-US" smtClean="0"/>
+              <a:t>Mateusz Iwo Dubaniowski</a:t>
+            </a:r>
             <a:endParaRPr lang="en-US"/>
           </a:p>
         </p:txBody>
@@ -1263,10 +1808,10 @@
           <a:bodyPr/>
           <a:lstStyle/>
           <a:p>
-            <a:fld id="{85281AA8-C4BE-BE48-9FDE-FFCDCC15F285}" type="datetimeFigureOut">
-              <a:rPr lang="en-US" smtClean="0"/>
-              <a:t>16/3/16</a:t>
-            </a:fld>
+            <a:r>
+              <a:rPr lang="pl-PL" smtClean="0"/>
+              <a:t>18/03/2016</a:t>
+            </a:r>
             <a:endParaRPr lang="en-US"/>
           </a:p>
         </p:txBody>
@@ -1290,6 +1835,10 @@
             </a:lvl1pPr>
           </a:lstStyle>
           <a:p>
+            <a:r>
+              <a:rPr lang="en-US" smtClean="0"/>
+              <a:t>Mateusz Iwo Dubaniowski</a:t>
+            </a:r>
             <a:endParaRPr lang="en-US"/>
           </a:p>
         </p:txBody>
@@ -1419,10 +1968,10 @@
             </a:lvl1pPr>
           </a:lstStyle>
           <a:p>
-            <a:fld id="{85281AA8-C4BE-BE48-9FDE-FFCDCC15F285}" type="datetimeFigureOut">
-              <a:rPr lang="en-US" smtClean="0"/>
-              <a:t>16/3/16</a:t>
-            </a:fld>
+            <a:r>
+              <a:rPr lang="pl-PL" smtClean="0"/>
+              <a:t>18/03/2016</a:t>
+            </a:r>
             <a:endParaRPr lang="en-US"/>
           </a:p>
         </p:txBody>
@@ -1451,6 +2000,10 @@
             </a:lvl1pPr>
           </a:lstStyle>
           <a:p>
+            <a:r>
+              <a:rPr lang="en-US" smtClean="0"/>
+              <a:t>Mateusz Iwo Dubaniowski</a:t>
+            </a:r>
             <a:endParaRPr lang="en-US"/>
           </a:p>
         </p:txBody>
@@ -1590,10 +2143,10 @@
             </a:lvl1pPr>
           </a:lstStyle>
           <a:p>
-            <a:fld id="{85281AA8-C4BE-BE48-9FDE-FFCDCC15F285}" type="datetimeFigureOut">
-              <a:rPr lang="en-US" smtClean="0"/>
-              <a:t>16/3/16</a:t>
-            </a:fld>
+            <a:r>
+              <a:rPr lang="pl-PL" smtClean="0"/>
+              <a:t>18/03/2016</a:t>
+            </a:r>
             <a:endParaRPr lang="en-US"/>
           </a:p>
         </p:txBody>
@@ -1622,6 +2175,10 @@
             </a:lvl1pPr>
           </a:lstStyle>
           <a:p>
+            <a:r>
+              <a:rPr lang="en-US" smtClean="0"/>
+              <a:t>Mateusz Iwo Dubaniowski</a:t>
+            </a:r>
             <a:endParaRPr lang="en-US"/>
           </a:p>
         </p:txBody>
@@ -1899,29 +2456,33 @@
           <a:bodyPr/>
           <a:lstStyle/>
           <a:p>
-            <a:fld id="{85281AA8-C4BE-BE48-9FDE-FFCDCC15F285}" type="datetimeFigureOut">
+            <a:r>
+              <a:rPr lang="pl-PL" smtClean="0"/>
+              <a:t>18/03/2016</a:t>
+            </a:r>
+            <a:endParaRPr lang="en-US"/>
+          </a:p>
+        </p:txBody>
+      </p:sp>
+      <p:sp>
+        <p:nvSpPr>
+          <p:cNvPr id="5" name="Footer Placeholder 4"/>
+          <p:cNvSpPr>
+            <a:spLocks noGrp="1"/>
+          </p:cNvSpPr>
+          <p:nvPr>
+            <p:ph type="ftr" sz="quarter" idx="11"/>
+          </p:nvPr>
+        </p:nvSpPr>
+        <p:spPr/>
+        <p:txBody>
+          <a:bodyPr/>
+          <a:lstStyle/>
+          <a:p>
+            <a:r>
               <a:rPr lang="en-US" smtClean="0"/>
-              <a:t>16/3/16</a:t>
-            </a:fld>
-            <a:endParaRPr lang="en-US"/>
-          </a:p>
-        </p:txBody>
-      </p:sp>
-      <p:sp>
-        <p:nvSpPr>
-          <p:cNvPr id="5" name="Footer Placeholder 4"/>
-          <p:cNvSpPr>
-            <a:spLocks noGrp="1"/>
-          </p:cNvSpPr>
-          <p:nvPr>
-            <p:ph type="ftr" sz="quarter" idx="11"/>
-          </p:nvPr>
-        </p:nvSpPr>
-        <p:spPr/>
-        <p:txBody>
-          <a:bodyPr/>
-          <a:lstStyle/>
-          <a:p>
+              <a:t>Mateusz Iwo Dubaniowski</a:t>
+            </a:r>
             <a:endParaRPr lang="en-US"/>
           </a:p>
         </p:txBody>
@@ -2226,10 +2787,10 @@
             </a:lvl1pPr>
           </a:lstStyle>
           <a:p>
-            <a:fld id="{85281AA8-C4BE-BE48-9FDE-FFCDCC15F285}" type="datetimeFigureOut">
-              <a:rPr lang="en-US" smtClean="0"/>
-              <a:t>16/3/16</a:t>
-            </a:fld>
+            <a:r>
+              <a:rPr lang="pl-PL" smtClean="0"/>
+              <a:t>18/03/2016</a:t>
+            </a:r>
             <a:endParaRPr lang="en-US"/>
           </a:p>
         </p:txBody>
@@ -2266,6 +2827,10 @@
             </a:lvl1pPr>
           </a:lstStyle>
           <a:p>
+            <a:r>
+              <a:rPr lang="en-US" smtClean="0"/>
+              <a:t>Mateusz Iwo Dubaniowski</a:t>
+            </a:r>
             <a:endParaRPr lang="en-US"/>
           </a:p>
         </p:txBody>
@@ -2746,7 +3311,7 @@
           <a:graphicData uri="http://schemas.openxmlformats.org/presentationml/2006/ole">
             <mc:AlternateContent xmlns:mc="http://schemas.openxmlformats.org/markup-compatibility/2006">
               <mc:Choice xmlns:v="urn:schemas-microsoft-com:vml" Requires="v">
-                <p:oleObj spid="_x0000_s1025" name="Corel DESIGNER" r:id="rId15" imgW="6882717" imgH="1850040" progId="CorelDESIGNER.Graphic.16">
+                <p:oleObj spid="_x0000_s1058" name="Corel DESIGNER" r:id="rId15" imgW="6882717" imgH="1850040" progId="CorelDESIGNER.Graphic.16">
                   <p:embed/>
                 </p:oleObj>
               </mc:Choice>
@@ -2827,6 +3392,7 @@
       </p:par>
     </p:tnLst>
   </p:timing>
+  <p:hf hdr="0"/>
   <p:txStyles>
     <p:titleStyle>
       <a:lvl1pPr algn="l" defTabSz="914400" rtl="0" eaLnBrk="1" latinLnBrk="0" hangingPunct="1">
@@ -3152,9 +3718,10 @@
           <a:bodyPr/>
           <a:lstStyle/>
           <a:p>
-            <a:r>
-              <a:rPr lang="en-US" dirty="0" smtClean="0"/>
-              <a:t>US power grid network disruption simulation</a:t>
+            <a:pPr algn="ctr"/>
+            <a:r>
+              <a:rPr lang="en-US" dirty="0" smtClean="0"/>
+              <a:t>Modeling US power grid network disruptions</a:t>
             </a:r>
             <a:endParaRPr lang="en-US" dirty="0"/>
           </a:p>
@@ -3180,6 +3747,75 @@
               <a:t>Mateusz Dubaniowski</a:t>
             </a:r>
             <a:endParaRPr lang="en-US" dirty="0"/>
+          </a:p>
+        </p:txBody>
+      </p:sp>
+      <p:sp>
+        <p:nvSpPr>
+          <p:cNvPr id="4" name="Date Placeholder 3"/>
+          <p:cNvSpPr>
+            <a:spLocks noGrp="1"/>
+          </p:cNvSpPr>
+          <p:nvPr>
+            <p:ph type="dt" sz="half" idx="10"/>
+          </p:nvPr>
+        </p:nvSpPr>
+        <p:spPr/>
+        <p:txBody>
+          <a:bodyPr/>
+          <a:lstStyle/>
+          <a:p>
+            <a:r>
+              <a:rPr lang="pl-PL" smtClean="0"/>
+              <a:t>18/03/2016</a:t>
+            </a:r>
+            <a:endParaRPr lang="en-US"/>
+          </a:p>
+        </p:txBody>
+      </p:sp>
+      <p:sp>
+        <p:nvSpPr>
+          <p:cNvPr id="5" name="Footer Placeholder 4"/>
+          <p:cNvSpPr>
+            <a:spLocks noGrp="1"/>
+          </p:cNvSpPr>
+          <p:nvPr>
+            <p:ph type="ftr" sz="quarter" idx="11"/>
+          </p:nvPr>
+        </p:nvSpPr>
+        <p:spPr/>
+        <p:txBody>
+          <a:bodyPr/>
+          <a:lstStyle/>
+          <a:p>
+            <a:r>
+              <a:rPr lang="en-US" smtClean="0"/>
+              <a:t>Mateusz Iwo Dubaniowski</a:t>
+            </a:r>
+            <a:endParaRPr lang="en-US"/>
+          </a:p>
+        </p:txBody>
+      </p:sp>
+      <p:sp>
+        <p:nvSpPr>
+          <p:cNvPr id="6" name="Slide Number Placeholder 5"/>
+          <p:cNvSpPr>
+            <a:spLocks noGrp="1"/>
+          </p:cNvSpPr>
+          <p:nvPr>
+            <p:ph type="sldNum" sz="quarter" idx="12"/>
+          </p:nvPr>
+        </p:nvSpPr>
+        <p:spPr/>
+        <p:txBody>
+          <a:bodyPr/>
+          <a:lstStyle/>
+          <a:p>
+            <a:fld id="{F2F669FB-DEBD-724A-B581-DA343F7DE862}" type="slidenum">
+              <a:rPr lang="en-US" smtClean="0"/>
+              <a:t>1</a:t>
+            </a:fld>
+            <a:endParaRPr lang="en-US"/>
           </a:p>
         </p:txBody>
       </p:sp>
@@ -3193,6 +3829,1953 @@
   <p:clrMapOvr>
     <a:masterClrMapping/>
   </p:clrMapOvr>
+</p:sld>
+</file>
+
+<file path=ppt/slides/slide10.xml><?xml version="1.0" encoding="utf-8"?>
+<p:sld xmlns:a="http://schemas.openxmlformats.org/drawingml/2006/main" xmlns:r="http://schemas.openxmlformats.org/officeDocument/2006/relationships" xmlns:p="http://schemas.openxmlformats.org/presentationml/2006/main">
+  <p:cSld>
+    <p:spTree>
+      <p:nvGrpSpPr>
+        <p:cNvPr id="1" name=""/>
+        <p:cNvGrpSpPr/>
+        <p:nvPr/>
+      </p:nvGrpSpPr>
+      <p:grpSpPr>
+        <a:xfrm>
+          <a:off x="0" y="0"/>
+          <a:ext cx="0" cy="0"/>
+          <a:chOff x="0" y="0"/>
+          <a:chExt cx="0" cy="0"/>
+        </a:xfrm>
+      </p:grpSpPr>
+      <p:sp>
+        <p:nvSpPr>
+          <p:cNvPr id="2" name="Title 1"/>
+          <p:cNvSpPr>
+            <a:spLocks noGrp="1"/>
+          </p:cNvSpPr>
+          <p:nvPr>
+            <p:ph type="title"/>
+          </p:nvPr>
+        </p:nvSpPr>
+        <p:spPr/>
+        <p:txBody>
+          <a:bodyPr/>
+          <a:lstStyle/>
+          <a:p>
+            <a:r>
+              <a:rPr lang="en-US" dirty="0" smtClean="0"/>
+              <a:t>Results</a:t>
+            </a:r>
+            <a:endParaRPr lang="en-US" dirty="0"/>
+          </a:p>
+        </p:txBody>
+      </p:sp>
+      <p:sp>
+        <p:nvSpPr>
+          <p:cNvPr id="3" name="Content Placeholder 2"/>
+          <p:cNvSpPr>
+            <a:spLocks noGrp="1"/>
+          </p:cNvSpPr>
+          <p:nvPr>
+            <p:ph idx="1"/>
+          </p:nvPr>
+        </p:nvSpPr>
+        <p:spPr/>
+        <p:txBody>
+          <a:bodyPr/>
+          <a:lstStyle/>
+          <a:p>
+            <a:r>
+              <a:rPr lang="en-US" dirty="0" smtClean="0"/>
+              <a:t>The results could help predict for a given network whether a removal of an edge or a node would constitute a failure of the network</a:t>
+            </a:r>
+          </a:p>
+          <a:p>
+            <a:r>
+              <a:rPr lang="en-US" dirty="0" smtClean="0"/>
+              <a:t>We can also see which edges are especially occupied in a given network i.e. which edges operate at peak bandwidth</a:t>
+            </a:r>
+          </a:p>
+          <a:p>
+            <a:r>
+              <a:rPr lang="en-US" dirty="0" smtClean="0"/>
+              <a:t>Moreover, we we can try what is the performance of a network as edge or node capacity only decreases</a:t>
+            </a:r>
+          </a:p>
+          <a:p>
+            <a:r>
+              <a:rPr lang="en-US" dirty="0" smtClean="0"/>
+              <a:t>This would allow us to devise more robust networks</a:t>
+            </a:r>
+          </a:p>
+          <a:p>
+            <a:endParaRPr lang="en-US" dirty="0" smtClean="0"/>
+          </a:p>
+          <a:p>
+            <a:pPr marL="0" indent="0">
+              <a:buNone/>
+            </a:pPr>
+            <a:endParaRPr lang="en-US" dirty="0"/>
+          </a:p>
+        </p:txBody>
+      </p:sp>
+      <p:sp>
+        <p:nvSpPr>
+          <p:cNvPr id="4" name="Date Placeholder 3"/>
+          <p:cNvSpPr>
+            <a:spLocks noGrp="1"/>
+          </p:cNvSpPr>
+          <p:nvPr>
+            <p:ph type="dt" sz="half" idx="10"/>
+          </p:nvPr>
+        </p:nvSpPr>
+        <p:spPr/>
+        <p:txBody>
+          <a:bodyPr/>
+          <a:lstStyle/>
+          <a:p>
+            <a:r>
+              <a:rPr lang="pl-PL" smtClean="0"/>
+              <a:t>18/03/2016</a:t>
+            </a:r>
+            <a:endParaRPr lang="en-US"/>
+          </a:p>
+        </p:txBody>
+      </p:sp>
+      <p:sp>
+        <p:nvSpPr>
+          <p:cNvPr id="5" name="Footer Placeholder 4"/>
+          <p:cNvSpPr>
+            <a:spLocks noGrp="1"/>
+          </p:cNvSpPr>
+          <p:nvPr>
+            <p:ph type="ftr" sz="quarter" idx="11"/>
+          </p:nvPr>
+        </p:nvSpPr>
+        <p:spPr/>
+        <p:txBody>
+          <a:bodyPr/>
+          <a:lstStyle/>
+          <a:p>
+            <a:r>
+              <a:rPr lang="en-US" smtClean="0"/>
+              <a:t>Mateusz Iwo Dubaniowski</a:t>
+            </a:r>
+            <a:endParaRPr lang="en-US"/>
+          </a:p>
+        </p:txBody>
+      </p:sp>
+      <p:sp>
+        <p:nvSpPr>
+          <p:cNvPr id="6" name="Slide Number Placeholder 5"/>
+          <p:cNvSpPr>
+            <a:spLocks noGrp="1"/>
+          </p:cNvSpPr>
+          <p:nvPr>
+            <p:ph type="sldNum" sz="quarter" idx="12"/>
+          </p:nvPr>
+        </p:nvSpPr>
+        <p:spPr/>
+        <p:txBody>
+          <a:bodyPr/>
+          <a:lstStyle/>
+          <a:p>
+            <a:fld id="{F2F669FB-DEBD-724A-B581-DA343F7DE862}" type="slidenum">
+              <a:rPr lang="en-US" smtClean="0"/>
+              <a:t>10</a:t>
+            </a:fld>
+            <a:endParaRPr lang="en-US"/>
+          </a:p>
+        </p:txBody>
+      </p:sp>
+    </p:spTree>
+    <p:extLst>
+      <p:ext uri="{BB962C8B-B14F-4D97-AF65-F5344CB8AC3E}">
+        <p14:creationId xmlns:p14="http://schemas.microsoft.com/office/powerpoint/2010/main" val="2347411934"/>
+      </p:ext>
+    </p:extLst>
+  </p:cSld>
+  <p:clrMapOvr>
+    <a:masterClrMapping/>
+  </p:clrMapOvr>
+  <p:transition xmlns:p14="http://schemas.microsoft.com/office/powerpoint/2010/main">
+    <p:fade/>
+  </p:transition>
+</p:sld>
+</file>
+
+<file path=ppt/slides/slide11.xml><?xml version="1.0" encoding="utf-8"?>
+<p:sld xmlns:a="http://schemas.openxmlformats.org/drawingml/2006/main" xmlns:r="http://schemas.openxmlformats.org/officeDocument/2006/relationships" xmlns:p="http://schemas.openxmlformats.org/presentationml/2006/main">
+  <p:cSld>
+    <p:spTree>
+      <p:nvGrpSpPr>
+        <p:cNvPr id="1" name=""/>
+        <p:cNvGrpSpPr/>
+        <p:nvPr/>
+      </p:nvGrpSpPr>
+      <p:grpSpPr>
+        <a:xfrm>
+          <a:off x="0" y="0"/>
+          <a:ext cx="0" cy="0"/>
+          <a:chOff x="0" y="0"/>
+          <a:chExt cx="0" cy="0"/>
+        </a:xfrm>
+      </p:grpSpPr>
+      <p:sp>
+        <p:nvSpPr>
+          <p:cNvPr id="2" name="Title 1"/>
+          <p:cNvSpPr>
+            <a:spLocks noGrp="1"/>
+          </p:cNvSpPr>
+          <p:nvPr>
+            <p:ph type="title"/>
+          </p:nvPr>
+        </p:nvSpPr>
+        <p:spPr/>
+        <p:txBody>
+          <a:bodyPr/>
+          <a:lstStyle/>
+          <a:p>
+            <a:r>
+              <a:rPr lang="en-US" dirty="0" smtClean="0"/>
+              <a:t>Summary</a:t>
+            </a:r>
+            <a:endParaRPr lang="en-US" dirty="0"/>
+          </a:p>
+        </p:txBody>
+      </p:sp>
+      <p:sp>
+        <p:nvSpPr>
+          <p:cNvPr id="3" name="Content Placeholder 2"/>
+          <p:cNvSpPr>
+            <a:spLocks noGrp="1"/>
+          </p:cNvSpPr>
+          <p:nvPr>
+            <p:ph idx="1"/>
+          </p:nvPr>
+        </p:nvSpPr>
+        <p:spPr/>
+        <p:txBody>
+          <a:bodyPr/>
+          <a:lstStyle/>
+          <a:p>
+            <a:r>
+              <a:rPr lang="en-US" dirty="0" smtClean="0"/>
+              <a:t>Understanding the critical points of an electrical supply network are crucial to its resiliency</a:t>
+            </a:r>
+          </a:p>
+          <a:p>
+            <a:r>
+              <a:rPr lang="en-US" dirty="0" smtClean="0"/>
+              <a:t>We developed a simulation that predicts US power grid’s behavior when a node is removed or its capacity decreased</a:t>
+            </a:r>
+          </a:p>
+          <a:p>
+            <a:r>
+              <a:rPr lang="en-US" dirty="0" smtClean="0"/>
+              <a:t>The approach uses load balancing of a graph as a main tool</a:t>
+            </a:r>
+          </a:p>
+          <a:p>
+            <a:r>
+              <a:rPr lang="en-US" dirty="0" smtClean="0"/>
+              <a:t>The model run with random capacities but same topology shows that network capacities design has a big impact on network’s resiliency</a:t>
+            </a:r>
+            <a:endParaRPr lang="en-US" dirty="0"/>
+          </a:p>
+        </p:txBody>
+      </p:sp>
+      <p:sp>
+        <p:nvSpPr>
+          <p:cNvPr id="4" name="Date Placeholder 3"/>
+          <p:cNvSpPr>
+            <a:spLocks noGrp="1"/>
+          </p:cNvSpPr>
+          <p:nvPr>
+            <p:ph type="dt" sz="half" idx="10"/>
+          </p:nvPr>
+        </p:nvSpPr>
+        <p:spPr/>
+        <p:txBody>
+          <a:bodyPr/>
+          <a:lstStyle/>
+          <a:p>
+            <a:r>
+              <a:rPr lang="pl-PL" smtClean="0"/>
+              <a:t>18/03/2016</a:t>
+            </a:r>
+            <a:endParaRPr lang="en-US"/>
+          </a:p>
+        </p:txBody>
+      </p:sp>
+      <p:sp>
+        <p:nvSpPr>
+          <p:cNvPr id="5" name="Footer Placeholder 4"/>
+          <p:cNvSpPr>
+            <a:spLocks noGrp="1"/>
+          </p:cNvSpPr>
+          <p:nvPr>
+            <p:ph type="ftr" sz="quarter" idx="11"/>
+          </p:nvPr>
+        </p:nvSpPr>
+        <p:spPr/>
+        <p:txBody>
+          <a:bodyPr/>
+          <a:lstStyle/>
+          <a:p>
+            <a:r>
+              <a:rPr lang="en-US" smtClean="0"/>
+              <a:t>Mateusz Iwo Dubaniowski</a:t>
+            </a:r>
+            <a:endParaRPr lang="en-US"/>
+          </a:p>
+        </p:txBody>
+      </p:sp>
+      <p:sp>
+        <p:nvSpPr>
+          <p:cNvPr id="6" name="Slide Number Placeholder 5"/>
+          <p:cNvSpPr>
+            <a:spLocks noGrp="1"/>
+          </p:cNvSpPr>
+          <p:nvPr>
+            <p:ph type="sldNum" sz="quarter" idx="12"/>
+          </p:nvPr>
+        </p:nvSpPr>
+        <p:spPr/>
+        <p:txBody>
+          <a:bodyPr/>
+          <a:lstStyle/>
+          <a:p>
+            <a:fld id="{F2F669FB-DEBD-724A-B581-DA343F7DE862}" type="slidenum">
+              <a:rPr lang="en-US" smtClean="0"/>
+              <a:t>11</a:t>
+            </a:fld>
+            <a:endParaRPr lang="en-US"/>
+          </a:p>
+        </p:txBody>
+      </p:sp>
+    </p:spTree>
+    <p:extLst>
+      <p:ext uri="{BB962C8B-B14F-4D97-AF65-F5344CB8AC3E}">
+        <p14:creationId xmlns:p14="http://schemas.microsoft.com/office/powerpoint/2010/main" val="2398082137"/>
+      </p:ext>
+    </p:extLst>
+  </p:cSld>
+  <p:clrMapOvr>
+    <a:masterClrMapping/>
+  </p:clrMapOvr>
+  <p:transition xmlns:p14="http://schemas.microsoft.com/office/powerpoint/2010/main">
+    <p:fade/>
+  </p:transition>
+</p:sld>
+</file>
+
+<file path=ppt/slides/slide2.xml><?xml version="1.0" encoding="utf-8"?>
+<p:sld xmlns:a="http://schemas.openxmlformats.org/drawingml/2006/main" xmlns:r="http://schemas.openxmlformats.org/officeDocument/2006/relationships" xmlns:p="http://schemas.openxmlformats.org/presentationml/2006/main">
+  <p:cSld>
+    <p:spTree>
+      <p:nvGrpSpPr>
+        <p:cNvPr id="1" name=""/>
+        <p:cNvGrpSpPr/>
+        <p:nvPr/>
+      </p:nvGrpSpPr>
+      <p:grpSpPr>
+        <a:xfrm>
+          <a:off x="0" y="0"/>
+          <a:ext cx="0" cy="0"/>
+          <a:chOff x="0" y="0"/>
+          <a:chExt cx="0" cy="0"/>
+        </a:xfrm>
+      </p:grpSpPr>
+      <p:sp>
+        <p:nvSpPr>
+          <p:cNvPr id="7" name="Title 6"/>
+          <p:cNvSpPr>
+            <a:spLocks noGrp="1"/>
+          </p:cNvSpPr>
+          <p:nvPr>
+            <p:ph type="title"/>
+          </p:nvPr>
+        </p:nvSpPr>
+        <p:spPr/>
+        <p:txBody>
+          <a:bodyPr/>
+          <a:lstStyle/>
+          <a:p>
+            <a:r>
+              <a:rPr lang="en-US" dirty="0" smtClean="0"/>
+              <a:t>Outline</a:t>
+            </a:r>
+            <a:endParaRPr lang="en-US" dirty="0"/>
+          </a:p>
+        </p:txBody>
+      </p:sp>
+      <p:sp>
+        <p:nvSpPr>
+          <p:cNvPr id="8" name="Content Placeholder 7"/>
+          <p:cNvSpPr>
+            <a:spLocks noGrp="1"/>
+          </p:cNvSpPr>
+          <p:nvPr>
+            <p:ph idx="1"/>
+          </p:nvPr>
+        </p:nvSpPr>
+        <p:spPr/>
+        <p:txBody>
+          <a:bodyPr/>
+          <a:lstStyle/>
+          <a:p>
+            <a:pPr marL="457200" indent="-457200">
+              <a:buFont typeface="+mj-lt"/>
+              <a:buAutoNum type="arabicPeriod"/>
+            </a:pPr>
+            <a:r>
+              <a:rPr lang="en-US" dirty="0" smtClean="0"/>
+              <a:t>Introduction – problem</a:t>
+            </a:r>
+          </a:p>
+          <a:p>
+            <a:pPr marL="457200" indent="-457200">
+              <a:buFont typeface="+mj-lt"/>
+              <a:buAutoNum type="arabicPeriod"/>
+            </a:pPr>
+            <a:r>
+              <a:rPr lang="en-US" dirty="0" smtClean="0"/>
+              <a:t>Task objective</a:t>
+            </a:r>
+          </a:p>
+          <a:p>
+            <a:pPr marL="457200" indent="-457200">
+              <a:buFont typeface="+mj-lt"/>
+              <a:buAutoNum type="arabicPeriod"/>
+            </a:pPr>
+            <a:r>
+              <a:rPr lang="en-US" dirty="0" smtClean="0"/>
+              <a:t>Solution</a:t>
+            </a:r>
+          </a:p>
+          <a:p>
+            <a:pPr marL="457200" indent="-457200">
+              <a:buFont typeface="+mj-lt"/>
+              <a:buAutoNum type="arabicPeriod"/>
+            </a:pPr>
+            <a:r>
+              <a:rPr lang="en-US" dirty="0" smtClean="0"/>
+              <a:t>Methodology</a:t>
+            </a:r>
+          </a:p>
+          <a:p>
+            <a:pPr marL="722313" lvl="1" indent="-457200"/>
+            <a:r>
+              <a:rPr lang="en-US" dirty="0" smtClean="0"/>
+              <a:t>Network description</a:t>
+            </a:r>
+          </a:p>
+          <a:p>
+            <a:pPr marL="722313" lvl="1" indent="-457200"/>
+            <a:r>
+              <a:rPr lang="en-US" dirty="0" smtClean="0"/>
+              <a:t>Balancing methodology</a:t>
+            </a:r>
+          </a:p>
+          <a:p>
+            <a:pPr marL="722313" lvl="1" indent="-457200"/>
+            <a:r>
+              <a:rPr lang="en-US" dirty="0" smtClean="0"/>
+              <a:t>Statistics reported</a:t>
+            </a:r>
+          </a:p>
+          <a:p>
+            <a:pPr marL="457200" indent="-457200">
+              <a:buFont typeface="+mj-lt"/>
+              <a:buAutoNum type="arabicPeriod"/>
+            </a:pPr>
+            <a:r>
+              <a:rPr lang="en-US" dirty="0" smtClean="0"/>
+              <a:t>Results</a:t>
+            </a:r>
+          </a:p>
+          <a:p>
+            <a:pPr marL="457200" indent="-457200">
+              <a:buFont typeface="+mj-lt"/>
+              <a:buAutoNum type="arabicPeriod"/>
+            </a:pPr>
+            <a:r>
+              <a:rPr lang="en-US" dirty="0" smtClean="0"/>
+              <a:t>Summary</a:t>
+            </a:r>
+            <a:endParaRPr lang="en-US" dirty="0"/>
+          </a:p>
+        </p:txBody>
+      </p:sp>
+      <p:sp>
+        <p:nvSpPr>
+          <p:cNvPr id="4" name="Date Placeholder 3"/>
+          <p:cNvSpPr>
+            <a:spLocks noGrp="1"/>
+          </p:cNvSpPr>
+          <p:nvPr>
+            <p:ph type="dt" sz="half" idx="10"/>
+          </p:nvPr>
+        </p:nvSpPr>
+        <p:spPr/>
+        <p:txBody>
+          <a:bodyPr/>
+          <a:lstStyle/>
+          <a:p>
+            <a:r>
+              <a:rPr lang="pl-PL" smtClean="0"/>
+              <a:t>18/03/2016</a:t>
+            </a:r>
+            <a:endParaRPr lang="en-US"/>
+          </a:p>
+        </p:txBody>
+      </p:sp>
+      <p:sp>
+        <p:nvSpPr>
+          <p:cNvPr id="5" name="Footer Placeholder 4"/>
+          <p:cNvSpPr>
+            <a:spLocks noGrp="1"/>
+          </p:cNvSpPr>
+          <p:nvPr>
+            <p:ph type="ftr" sz="quarter" idx="11"/>
+          </p:nvPr>
+        </p:nvSpPr>
+        <p:spPr/>
+        <p:txBody>
+          <a:bodyPr/>
+          <a:lstStyle/>
+          <a:p>
+            <a:r>
+              <a:rPr lang="en-US" smtClean="0"/>
+              <a:t>Mateusz Iwo Dubaniowski</a:t>
+            </a:r>
+            <a:endParaRPr lang="en-US"/>
+          </a:p>
+        </p:txBody>
+      </p:sp>
+      <p:sp>
+        <p:nvSpPr>
+          <p:cNvPr id="6" name="Slide Number Placeholder 5"/>
+          <p:cNvSpPr>
+            <a:spLocks noGrp="1"/>
+          </p:cNvSpPr>
+          <p:nvPr>
+            <p:ph type="sldNum" sz="quarter" idx="12"/>
+          </p:nvPr>
+        </p:nvSpPr>
+        <p:spPr/>
+        <p:txBody>
+          <a:bodyPr/>
+          <a:lstStyle/>
+          <a:p>
+            <a:fld id="{F2F669FB-DEBD-724A-B581-DA343F7DE862}" type="slidenum">
+              <a:rPr lang="en-US" smtClean="0"/>
+              <a:t>2</a:t>
+            </a:fld>
+            <a:endParaRPr lang="en-US"/>
+          </a:p>
+        </p:txBody>
+      </p:sp>
+    </p:spTree>
+    <p:extLst>
+      <p:ext uri="{BB962C8B-B14F-4D97-AF65-F5344CB8AC3E}">
+        <p14:creationId xmlns:p14="http://schemas.microsoft.com/office/powerpoint/2010/main" val="1509313847"/>
+      </p:ext>
+    </p:extLst>
+  </p:cSld>
+  <p:clrMapOvr>
+    <a:masterClrMapping/>
+  </p:clrMapOvr>
+  <p:transition xmlns:p14="http://schemas.microsoft.com/office/powerpoint/2010/main">
+    <p:fade/>
+  </p:transition>
+</p:sld>
+</file>
+
+<file path=ppt/slides/slide3.xml><?xml version="1.0" encoding="utf-8"?>
+<p:sld xmlns:a="http://schemas.openxmlformats.org/drawingml/2006/main" xmlns:r="http://schemas.openxmlformats.org/officeDocument/2006/relationships" xmlns:p="http://schemas.openxmlformats.org/presentationml/2006/main">
+  <p:cSld>
+    <p:spTree>
+      <p:nvGrpSpPr>
+        <p:cNvPr id="1" name=""/>
+        <p:cNvGrpSpPr/>
+        <p:nvPr/>
+      </p:nvGrpSpPr>
+      <p:grpSpPr>
+        <a:xfrm>
+          <a:off x="0" y="0"/>
+          <a:ext cx="0" cy="0"/>
+          <a:chOff x="0" y="0"/>
+          <a:chExt cx="0" cy="0"/>
+        </a:xfrm>
+      </p:grpSpPr>
+      <p:sp>
+        <p:nvSpPr>
+          <p:cNvPr id="7" name="Title 6"/>
+          <p:cNvSpPr>
+            <a:spLocks noGrp="1"/>
+          </p:cNvSpPr>
+          <p:nvPr>
+            <p:ph type="title"/>
+          </p:nvPr>
+        </p:nvSpPr>
+        <p:spPr/>
+        <p:txBody>
+          <a:bodyPr/>
+          <a:lstStyle/>
+          <a:p>
+            <a:r>
+              <a:rPr lang="en-US" dirty="0" smtClean="0"/>
+              <a:t>Problem</a:t>
+            </a:r>
+            <a:endParaRPr lang="en-US" dirty="0"/>
+          </a:p>
+        </p:txBody>
+      </p:sp>
+      <p:sp>
+        <p:nvSpPr>
+          <p:cNvPr id="8" name="Content Placeholder 7"/>
+          <p:cNvSpPr>
+            <a:spLocks noGrp="1"/>
+          </p:cNvSpPr>
+          <p:nvPr>
+            <p:ph idx="1"/>
+          </p:nvPr>
+        </p:nvSpPr>
+        <p:spPr/>
+        <p:txBody>
+          <a:bodyPr/>
+          <a:lstStyle/>
+          <a:p>
+            <a:r>
+              <a:rPr lang="en-US" dirty="0" smtClean="0"/>
+              <a:t>Electricity is an important part of our lives</a:t>
+            </a:r>
+          </a:p>
+          <a:p>
+            <a:r>
+              <a:rPr lang="en-US" dirty="0" smtClean="0"/>
+              <a:t>Used by businesses, individuals, governments…</a:t>
+            </a:r>
+            <a:endParaRPr lang="en-US" dirty="0"/>
+          </a:p>
+          <a:p>
+            <a:r>
+              <a:rPr lang="en-US" dirty="0" smtClean="0"/>
+              <a:t>Electrical grids consist of many various components</a:t>
+            </a:r>
+          </a:p>
+          <a:p>
+            <a:r>
+              <a:rPr lang="en-US" dirty="0" smtClean="0"/>
+              <a:t>Potential targets of hostile attacks</a:t>
+            </a:r>
+          </a:p>
+          <a:p>
+            <a:r>
+              <a:rPr lang="en-US" dirty="0" smtClean="0"/>
+              <a:t>Environmental conditions could have significant impact</a:t>
+            </a:r>
+          </a:p>
+          <a:p>
+            <a:endParaRPr lang="en-US" dirty="0"/>
+          </a:p>
+          <a:p>
+            <a:r>
+              <a:rPr lang="en-US" dirty="0" smtClean="0"/>
+              <a:t>Identifying the most critical elements of power grid systems</a:t>
+            </a:r>
+          </a:p>
+          <a:p>
+            <a:r>
+              <a:rPr lang="en-US" dirty="0" smtClean="0"/>
+              <a:t>How we could mitigate failures of these components</a:t>
+            </a:r>
+          </a:p>
+          <a:p>
+            <a:endParaRPr lang="en-US" dirty="0" smtClean="0"/>
+          </a:p>
+          <a:p>
+            <a:endParaRPr lang="en-US" dirty="0" smtClean="0"/>
+          </a:p>
+          <a:p>
+            <a:endParaRPr lang="en-US" dirty="0" smtClean="0"/>
+          </a:p>
+        </p:txBody>
+      </p:sp>
+      <p:sp>
+        <p:nvSpPr>
+          <p:cNvPr id="4" name="Date Placeholder 3"/>
+          <p:cNvSpPr>
+            <a:spLocks noGrp="1"/>
+          </p:cNvSpPr>
+          <p:nvPr>
+            <p:ph type="dt" sz="half" idx="10"/>
+          </p:nvPr>
+        </p:nvSpPr>
+        <p:spPr/>
+        <p:txBody>
+          <a:bodyPr/>
+          <a:lstStyle/>
+          <a:p>
+            <a:r>
+              <a:rPr lang="pl-PL" smtClean="0"/>
+              <a:t>18/03/2016</a:t>
+            </a:r>
+            <a:endParaRPr lang="en-US"/>
+          </a:p>
+        </p:txBody>
+      </p:sp>
+      <p:sp>
+        <p:nvSpPr>
+          <p:cNvPr id="5" name="Footer Placeholder 4"/>
+          <p:cNvSpPr>
+            <a:spLocks noGrp="1"/>
+          </p:cNvSpPr>
+          <p:nvPr>
+            <p:ph type="ftr" sz="quarter" idx="11"/>
+          </p:nvPr>
+        </p:nvSpPr>
+        <p:spPr/>
+        <p:txBody>
+          <a:bodyPr/>
+          <a:lstStyle/>
+          <a:p>
+            <a:r>
+              <a:rPr lang="en-US" smtClean="0"/>
+              <a:t>Mateusz Iwo Dubaniowski</a:t>
+            </a:r>
+            <a:endParaRPr lang="en-US"/>
+          </a:p>
+        </p:txBody>
+      </p:sp>
+      <p:sp>
+        <p:nvSpPr>
+          <p:cNvPr id="6" name="Slide Number Placeholder 5"/>
+          <p:cNvSpPr>
+            <a:spLocks noGrp="1"/>
+          </p:cNvSpPr>
+          <p:nvPr>
+            <p:ph type="sldNum" sz="quarter" idx="12"/>
+          </p:nvPr>
+        </p:nvSpPr>
+        <p:spPr/>
+        <p:txBody>
+          <a:bodyPr/>
+          <a:lstStyle/>
+          <a:p>
+            <a:fld id="{F2F669FB-DEBD-724A-B581-DA343F7DE862}" type="slidenum">
+              <a:rPr lang="en-US" smtClean="0"/>
+              <a:t>3</a:t>
+            </a:fld>
+            <a:endParaRPr lang="en-US"/>
+          </a:p>
+        </p:txBody>
+      </p:sp>
+    </p:spTree>
+    <p:extLst>
+      <p:ext uri="{BB962C8B-B14F-4D97-AF65-F5344CB8AC3E}">
+        <p14:creationId xmlns:p14="http://schemas.microsoft.com/office/powerpoint/2010/main" val="251525790"/>
+      </p:ext>
+    </p:extLst>
+  </p:cSld>
+  <p:clrMapOvr>
+    <a:masterClrMapping/>
+  </p:clrMapOvr>
+  <p:transition xmlns:p14="http://schemas.microsoft.com/office/powerpoint/2010/main">
+    <p:fade/>
+  </p:transition>
+</p:sld>
+</file>
+
+<file path=ppt/slides/slide4.xml><?xml version="1.0" encoding="utf-8"?>
+<p:sld xmlns:a="http://schemas.openxmlformats.org/drawingml/2006/main" xmlns:r="http://schemas.openxmlformats.org/officeDocument/2006/relationships" xmlns:p="http://schemas.openxmlformats.org/presentationml/2006/main">
+  <p:cSld>
+    <p:spTree>
+      <p:nvGrpSpPr>
+        <p:cNvPr id="1" name=""/>
+        <p:cNvGrpSpPr/>
+        <p:nvPr/>
+      </p:nvGrpSpPr>
+      <p:grpSpPr>
+        <a:xfrm>
+          <a:off x="0" y="0"/>
+          <a:ext cx="0" cy="0"/>
+          <a:chOff x="0" y="0"/>
+          <a:chExt cx="0" cy="0"/>
+        </a:xfrm>
+      </p:grpSpPr>
+      <p:sp>
+        <p:nvSpPr>
+          <p:cNvPr id="2" name="Title 1"/>
+          <p:cNvSpPr>
+            <a:spLocks noGrp="1"/>
+          </p:cNvSpPr>
+          <p:nvPr>
+            <p:ph type="title"/>
+          </p:nvPr>
+        </p:nvSpPr>
+        <p:spPr/>
+        <p:txBody>
+          <a:bodyPr/>
+          <a:lstStyle/>
+          <a:p>
+            <a:r>
+              <a:rPr lang="en-US" dirty="0" smtClean="0"/>
+              <a:t>Task</a:t>
+            </a:r>
+            <a:endParaRPr lang="en-US" dirty="0"/>
+          </a:p>
+        </p:txBody>
+      </p:sp>
+      <p:sp>
+        <p:nvSpPr>
+          <p:cNvPr id="3" name="Content Placeholder 2"/>
+          <p:cNvSpPr>
+            <a:spLocks noGrp="1"/>
+          </p:cNvSpPr>
+          <p:nvPr>
+            <p:ph idx="1"/>
+          </p:nvPr>
+        </p:nvSpPr>
+        <p:spPr/>
+        <p:txBody>
+          <a:bodyPr/>
+          <a:lstStyle/>
+          <a:p>
+            <a:r>
+              <a:rPr lang="en-US" dirty="0" smtClean="0"/>
+              <a:t>To design and implement a network simulation of a power grid network and measure its response to node or edge failures</a:t>
+            </a:r>
+          </a:p>
+          <a:p>
+            <a:r>
+              <a:rPr lang="en-US" dirty="0" smtClean="0"/>
+              <a:t>US power grid topology from </a:t>
+            </a:r>
+            <a:r>
+              <a:rPr lang="en-US" dirty="0"/>
+              <a:t>D. J. Watts and S. H. </a:t>
+            </a:r>
+            <a:r>
+              <a:rPr lang="en-US" dirty="0" err="1"/>
+              <a:t>Strogatz</a:t>
+            </a:r>
+            <a:r>
+              <a:rPr lang="en-US" dirty="0"/>
+              <a:t>, Nature 393, 440-442 (1998</a:t>
+            </a:r>
+            <a:r>
+              <a:rPr lang="en-US" dirty="0" smtClean="0"/>
+              <a:t>) was used</a:t>
+            </a:r>
+          </a:p>
+          <a:p>
+            <a:endParaRPr lang="en-US" dirty="0" smtClean="0"/>
+          </a:p>
+          <a:p>
+            <a:r>
+              <a:rPr lang="en-US" dirty="0" smtClean="0"/>
+              <a:t>Topology only, values of vertices and edges are randomly generated</a:t>
+            </a:r>
+            <a:endParaRPr lang="en-US" dirty="0"/>
+          </a:p>
+        </p:txBody>
+      </p:sp>
+      <p:sp>
+        <p:nvSpPr>
+          <p:cNvPr id="4" name="Date Placeholder 3"/>
+          <p:cNvSpPr>
+            <a:spLocks noGrp="1"/>
+          </p:cNvSpPr>
+          <p:nvPr>
+            <p:ph type="dt" sz="half" idx="10"/>
+          </p:nvPr>
+        </p:nvSpPr>
+        <p:spPr/>
+        <p:txBody>
+          <a:bodyPr/>
+          <a:lstStyle/>
+          <a:p>
+            <a:r>
+              <a:rPr lang="pl-PL" smtClean="0"/>
+              <a:t>18/03/2016</a:t>
+            </a:r>
+            <a:endParaRPr lang="en-US"/>
+          </a:p>
+        </p:txBody>
+      </p:sp>
+      <p:sp>
+        <p:nvSpPr>
+          <p:cNvPr id="5" name="Footer Placeholder 4"/>
+          <p:cNvSpPr>
+            <a:spLocks noGrp="1"/>
+          </p:cNvSpPr>
+          <p:nvPr>
+            <p:ph type="ftr" sz="quarter" idx="11"/>
+          </p:nvPr>
+        </p:nvSpPr>
+        <p:spPr/>
+        <p:txBody>
+          <a:bodyPr/>
+          <a:lstStyle/>
+          <a:p>
+            <a:r>
+              <a:rPr lang="en-US" smtClean="0"/>
+              <a:t>Mateusz Iwo Dubaniowski</a:t>
+            </a:r>
+            <a:endParaRPr lang="en-US"/>
+          </a:p>
+        </p:txBody>
+      </p:sp>
+      <p:sp>
+        <p:nvSpPr>
+          <p:cNvPr id="6" name="Slide Number Placeholder 5"/>
+          <p:cNvSpPr>
+            <a:spLocks noGrp="1"/>
+          </p:cNvSpPr>
+          <p:nvPr>
+            <p:ph type="sldNum" sz="quarter" idx="12"/>
+          </p:nvPr>
+        </p:nvSpPr>
+        <p:spPr/>
+        <p:txBody>
+          <a:bodyPr/>
+          <a:lstStyle/>
+          <a:p>
+            <a:fld id="{F2F669FB-DEBD-724A-B581-DA343F7DE862}" type="slidenum">
+              <a:rPr lang="en-US" smtClean="0"/>
+              <a:t>4</a:t>
+            </a:fld>
+            <a:endParaRPr lang="en-US"/>
+          </a:p>
+        </p:txBody>
+      </p:sp>
+    </p:spTree>
+    <p:extLst>
+      <p:ext uri="{BB962C8B-B14F-4D97-AF65-F5344CB8AC3E}">
+        <p14:creationId xmlns:p14="http://schemas.microsoft.com/office/powerpoint/2010/main" val="2120510188"/>
+      </p:ext>
+    </p:extLst>
+  </p:cSld>
+  <p:clrMapOvr>
+    <a:masterClrMapping/>
+  </p:clrMapOvr>
+  <p:transition xmlns:p14="http://schemas.microsoft.com/office/powerpoint/2010/main">
+    <p:fade/>
+  </p:transition>
+</p:sld>
+</file>
+
+<file path=ppt/slides/slide5.xml><?xml version="1.0" encoding="utf-8"?>
+<p:sld xmlns:a="http://schemas.openxmlformats.org/drawingml/2006/main" xmlns:r="http://schemas.openxmlformats.org/officeDocument/2006/relationships" xmlns:p="http://schemas.openxmlformats.org/presentationml/2006/main">
+  <p:cSld>
+    <p:spTree>
+      <p:nvGrpSpPr>
+        <p:cNvPr id="1" name=""/>
+        <p:cNvGrpSpPr/>
+        <p:nvPr/>
+      </p:nvGrpSpPr>
+      <p:grpSpPr>
+        <a:xfrm>
+          <a:off x="0" y="0"/>
+          <a:ext cx="0" cy="0"/>
+          <a:chOff x="0" y="0"/>
+          <a:chExt cx="0" cy="0"/>
+        </a:xfrm>
+      </p:grpSpPr>
+      <p:sp>
+        <p:nvSpPr>
+          <p:cNvPr id="2" name="Title 1"/>
+          <p:cNvSpPr>
+            <a:spLocks noGrp="1"/>
+          </p:cNvSpPr>
+          <p:nvPr>
+            <p:ph type="title"/>
+          </p:nvPr>
+        </p:nvSpPr>
+        <p:spPr/>
+        <p:txBody>
+          <a:bodyPr/>
+          <a:lstStyle/>
+          <a:p>
+            <a:r>
+              <a:rPr lang="en-US" dirty="0" smtClean="0"/>
+              <a:t>Solution</a:t>
+            </a:r>
+            <a:endParaRPr lang="en-US" dirty="0"/>
+          </a:p>
+        </p:txBody>
+      </p:sp>
+      <p:sp>
+        <p:nvSpPr>
+          <p:cNvPr id="3" name="Content Placeholder 2"/>
+          <p:cNvSpPr>
+            <a:spLocks noGrp="1"/>
+          </p:cNvSpPr>
+          <p:nvPr>
+            <p:ph idx="1"/>
+          </p:nvPr>
+        </p:nvSpPr>
+        <p:spPr>
+          <a:xfrm>
+            <a:off x="323850" y="1797232"/>
+            <a:ext cx="8496300" cy="4436878"/>
+          </a:xfrm>
+        </p:spPr>
+        <p:txBody>
+          <a:bodyPr/>
+          <a:lstStyle/>
+          <a:p>
+            <a:pPr marL="457200" indent="-457200">
+              <a:buFont typeface="+mj-lt"/>
+              <a:buAutoNum type="arabicPeriod"/>
+            </a:pPr>
+            <a:r>
+              <a:rPr lang="en-US" dirty="0" smtClean="0"/>
+              <a:t>Set up a network based on the US power grid topology</a:t>
+            </a:r>
+          </a:p>
+          <a:p>
+            <a:pPr marL="457200" indent="-457200">
+              <a:buFont typeface="+mj-lt"/>
+              <a:buAutoNum type="arabicPeriod"/>
+            </a:pPr>
+            <a:r>
+              <a:rPr lang="en-US" dirty="0" smtClean="0"/>
+              <a:t>Populate the network with attributes for edges and vertices</a:t>
+            </a:r>
+          </a:p>
+          <a:p>
+            <a:pPr marL="722313" lvl="1" indent="-457200"/>
+            <a:r>
+              <a:rPr lang="en-US" dirty="0" smtClean="0"/>
+              <a:t>Capacities of vertices – energy production or consumption</a:t>
+            </a:r>
+          </a:p>
+          <a:p>
+            <a:pPr marL="722313" lvl="1" indent="-457200"/>
+            <a:r>
+              <a:rPr lang="en-US" dirty="0" smtClean="0"/>
+              <a:t>Capacities of edges – transmission lines’ bandwidth</a:t>
+            </a:r>
+          </a:p>
+          <a:p>
+            <a:pPr marL="457200" indent="-457200">
+              <a:buFont typeface="+mj-lt"/>
+              <a:buAutoNum type="arabicPeriod"/>
+            </a:pPr>
+            <a:r>
+              <a:rPr lang="en-US" dirty="0" smtClean="0"/>
+              <a:t>Load balance the network to make sure all capacities of vertices &gt;0</a:t>
+            </a:r>
+          </a:p>
+          <a:p>
+            <a:pPr marL="457200" indent="-457200">
+              <a:buFont typeface="+mj-lt"/>
+              <a:buAutoNum type="arabicPeriod"/>
+            </a:pPr>
+            <a:r>
+              <a:rPr lang="en-US" dirty="0" smtClean="0"/>
+              <a:t>Remove a node or an edge (or decrease capacity)</a:t>
+            </a:r>
+          </a:p>
+          <a:p>
+            <a:pPr marL="457200" indent="-457200">
+              <a:buFont typeface="+mj-lt"/>
+              <a:buAutoNum type="arabicPeriod"/>
+            </a:pPr>
+            <a:r>
+              <a:rPr lang="en-US" dirty="0" err="1" smtClean="0"/>
+              <a:t>Attemptload</a:t>
+            </a:r>
+            <a:r>
+              <a:rPr lang="en-US" dirty="0" smtClean="0"/>
+              <a:t> balancing again</a:t>
+            </a:r>
+          </a:p>
+          <a:p>
+            <a:pPr marL="457200" indent="-457200">
+              <a:buFont typeface="+mj-lt"/>
+              <a:buAutoNum type="arabicPeriod"/>
+            </a:pPr>
+            <a:r>
+              <a:rPr lang="en-US" dirty="0" smtClean="0"/>
+              <a:t>Present the results and various statistics about the networks</a:t>
+            </a:r>
+            <a:endParaRPr lang="en-US" dirty="0"/>
+          </a:p>
+        </p:txBody>
+      </p:sp>
+      <p:sp>
+        <p:nvSpPr>
+          <p:cNvPr id="4" name="Date Placeholder 3"/>
+          <p:cNvSpPr>
+            <a:spLocks noGrp="1"/>
+          </p:cNvSpPr>
+          <p:nvPr>
+            <p:ph type="dt" sz="half" idx="10"/>
+          </p:nvPr>
+        </p:nvSpPr>
+        <p:spPr/>
+        <p:txBody>
+          <a:bodyPr/>
+          <a:lstStyle/>
+          <a:p>
+            <a:r>
+              <a:rPr lang="pl-PL" smtClean="0"/>
+              <a:t>18/03/2016</a:t>
+            </a:r>
+            <a:endParaRPr lang="en-US"/>
+          </a:p>
+        </p:txBody>
+      </p:sp>
+      <p:sp>
+        <p:nvSpPr>
+          <p:cNvPr id="5" name="Footer Placeholder 4"/>
+          <p:cNvSpPr>
+            <a:spLocks noGrp="1"/>
+          </p:cNvSpPr>
+          <p:nvPr>
+            <p:ph type="ftr" sz="quarter" idx="11"/>
+          </p:nvPr>
+        </p:nvSpPr>
+        <p:spPr/>
+        <p:txBody>
+          <a:bodyPr/>
+          <a:lstStyle/>
+          <a:p>
+            <a:r>
+              <a:rPr lang="en-US" smtClean="0"/>
+              <a:t>Mateusz Iwo Dubaniowski</a:t>
+            </a:r>
+            <a:endParaRPr lang="en-US"/>
+          </a:p>
+        </p:txBody>
+      </p:sp>
+      <p:sp>
+        <p:nvSpPr>
+          <p:cNvPr id="6" name="Slide Number Placeholder 5"/>
+          <p:cNvSpPr>
+            <a:spLocks noGrp="1"/>
+          </p:cNvSpPr>
+          <p:nvPr>
+            <p:ph type="sldNum" sz="quarter" idx="12"/>
+          </p:nvPr>
+        </p:nvSpPr>
+        <p:spPr/>
+        <p:txBody>
+          <a:bodyPr/>
+          <a:lstStyle/>
+          <a:p>
+            <a:fld id="{F2F669FB-DEBD-724A-B581-DA343F7DE862}" type="slidenum">
+              <a:rPr lang="en-US" smtClean="0"/>
+              <a:t>5</a:t>
+            </a:fld>
+            <a:endParaRPr lang="en-US"/>
+          </a:p>
+        </p:txBody>
+      </p:sp>
+    </p:spTree>
+    <p:extLst>
+      <p:ext uri="{BB962C8B-B14F-4D97-AF65-F5344CB8AC3E}">
+        <p14:creationId xmlns:p14="http://schemas.microsoft.com/office/powerpoint/2010/main" val="1295589085"/>
+      </p:ext>
+    </p:extLst>
+  </p:cSld>
+  <p:clrMapOvr>
+    <a:masterClrMapping/>
+  </p:clrMapOvr>
+  <p:transition xmlns:p14="http://schemas.microsoft.com/office/powerpoint/2010/main">
+    <p:fade/>
+  </p:transition>
+</p:sld>
+</file>
+
+<file path=ppt/slides/slide6.xml><?xml version="1.0" encoding="utf-8"?>
+<p:sld xmlns:a="http://schemas.openxmlformats.org/drawingml/2006/main" xmlns:r="http://schemas.openxmlformats.org/officeDocument/2006/relationships" xmlns:p="http://schemas.openxmlformats.org/presentationml/2006/main">
+  <p:cSld>
+    <p:spTree>
+      <p:nvGrpSpPr>
+        <p:cNvPr id="1" name=""/>
+        <p:cNvGrpSpPr/>
+        <p:nvPr/>
+      </p:nvGrpSpPr>
+      <p:grpSpPr>
+        <a:xfrm>
+          <a:off x="0" y="0"/>
+          <a:ext cx="0" cy="0"/>
+          <a:chOff x="0" y="0"/>
+          <a:chExt cx="0" cy="0"/>
+        </a:xfrm>
+      </p:grpSpPr>
+      <p:sp>
+        <p:nvSpPr>
+          <p:cNvPr id="2" name="Title 1"/>
+          <p:cNvSpPr>
+            <a:spLocks noGrp="1"/>
+          </p:cNvSpPr>
+          <p:nvPr>
+            <p:ph type="title"/>
+          </p:nvPr>
+        </p:nvSpPr>
+        <p:spPr/>
+        <p:txBody>
+          <a:bodyPr/>
+          <a:lstStyle/>
+          <a:p>
+            <a:r>
+              <a:rPr lang="en-US" dirty="0" smtClean="0"/>
+              <a:t>Methodology – network population</a:t>
+            </a:r>
+            <a:endParaRPr lang="en-US" dirty="0"/>
+          </a:p>
+        </p:txBody>
+      </p:sp>
+      <p:sp>
+        <p:nvSpPr>
+          <p:cNvPr id="3" name="Content Placeholder 2"/>
+          <p:cNvSpPr>
+            <a:spLocks noGrp="1"/>
+          </p:cNvSpPr>
+          <p:nvPr>
+            <p:ph idx="1"/>
+          </p:nvPr>
+        </p:nvSpPr>
+        <p:spPr>
+          <a:xfrm>
+            <a:off x="323850" y="1829517"/>
+            <a:ext cx="8496300" cy="4404593"/>
+          </a:xfrm>
+        </p:spPr>
+        <p:txBody>
+          <a:bodyPr/>
+          <a:lstStyle/>
+          <a:p>
+            <a:r>
+              <a:rPr lang="en-US" dirty="0" smtClean="0"/>
+              <a:t>US power grid network graph used is just a topology</a:t>
+            </a:r>
+          </a:p>
+          <a:p>
+            <a:r>
+              <a:rPr lang="en-US" dirty="0" smtClean="0"/>
+              <a:t>Network needs to be populated with data about energy sources and edges capacities</a:t>
+            </a:r>
+          </a:p>
+          <a:p>
+            <a:r>
+              <a:rPr lang="en-US" dirty="0" smtClean="0"/>
+              <a:t>We use 1/40 nodes as energy producers and randomly assign the amount produced</a:t>
+            </a:r>
+          </a:p>
+          <a:p>
+            <a:r>
+              <a:rPr lang="en-US" dirty="0" smtClean="0"/>
+              <a:t>We use the rest as consumers, which consume 5-100 times smaller amounts</a:t>
+            </a:r>
+          </a:p>
+          <a:p>
+            <a:r>
+              <a:rPr lang="en-US" dirty="0" smtClean="0"/>
+              <a:t>The edges are populated accordingly to be able to handle twice the average load of an edge</a:t>
+            </a:r>
+          </a:p>
+          <a:p>
+            <a:r>
+              <a:rPr lang="en-US" dirty="0" smtClean="0"/>
+              <a:t>Each node can be theoretically discharged through connected edges</a:t>
+            </a:r>
+            <a:endParaRPr lang="en-US" dirty="0"/>
+          </a:p>
+        </p:txBody>
+      </p:sp>
+      <p:sp>
+        <p:nvSpPr>
+          <p:cNvPr id="4" name="Date Placeholder 3"/>
+          <p:cNvSpPr>
+            <a:spLocks noGrp="1"/>
+          </p:cNvSpPr>
+          <p:nvPr>
+            <p:ph type="dt" sz="half" idx="10"/>
+          </p:nvPr>
+        </p:nvSpPr>
+        <p:spPr/>
+        <p:txBody>
+          <a:bodyPr/>
+          <a:lstStyle/>
+          <a:p>
+            <a:r>
+              <a:rPr lang="pl-PL" smtClean="0"/>
+              <a:t>18/03/2016</a:t>
+            </a:r>
+            <a:endParaRPr lang="en-US"/>
+          </a:p>
+        </p:txBody>
+      </p:sp>
+      <p:sp>
+        <p:nvSpPr>
+          <p:cNvPr id="5" name="Footer Placeholder 4"/>
+          <p:cNvSpPr>
+            <a:spLocks noGrp="1"/>
+          </p:cNvSpPr>
+          <p:nvPr>
+            <p:ph type="ftr" sz="quarter" idx="11"/>
+          </p:nvPr>
+        </p:nvSpPr>
+        <p:spPr/>
+        <p:txBody>
+          <a:bodyPr/>
+          <a:lstStyle/>
+          <a:p>
+            <a:r>
+              <a:rPr lang="en-US" smtClean="0"/>
+              <a:t>Mateusz Iwo Dubaniowski</a:t>
+            </a:r>
+            <a:endParaRPr lang="en-US"/>
+          </a:p>
+        </p:txBody>
+      </p:sp>
+      <p:sp>
+        <p:nvSpPr>
+          <p:cNvPr id="6" name="Slide Number Placeholder 5"/>
+          <p:cNvSpPr>
+            <a:spLocks noGrp="1"/>
+          </p:cNvSpPr>
+          <p:nvPr>
+            <p:ph type="sldNum" sz="quarter" idx="12"/>
+          </p:nvPr>
+        </p:nvSpPr>
+        <p:spPr/>
+        <p:txBody>
+          <a:bodyPr/>
+          <a:lstStyle/>
+          <a:p>
+            <a:fld id="{F2F669FB-DEBD-724A-B581-DA343F7DE862}" type="slidenum">
+              <a:rPr lang="en-US" smtClean="0"/>
+              <a:t>6</a:t>
+            </a:fld>
+            <a:endParaRPr lang="en-US"/>
+          </a:p>
+        </p:txBody>
+      </p:sp>
+    </p:spTree>
+    <p:extLst>
+      <p:ext uri="{BB962C8B-B14F-4D97-AF65-F5344CB8AC3E}">
+        <p14:creationId xmlns:p14="http://schemas.microsoft.com/office/powerpoint/2010/main" val="993950198"/>
+      </p:ext>
+    </p:extLst>
+  </p:cSld>
+  <p:clrMapOvr>
+    <a:masterClrMapping/>
+  </p:clrMapOvr>
+  <p:transition xmlns:p14="http://schemas.microsoft.com/office/powerpoint/2010/main">
+    <p:fade/>
+  </p:transition>
+</p:sld>
+</file>
+
+<file path=ppt/slides/slide7.xml><?xml version="1.0" encoding="utf-8"?>
+<p:sld xmlns:a="http://schemas.openxmlformats.org/drawingml/2006/main" xmlns:r="http://schemas.openxmlformats.org/officeDocument/2006/relationships" xmlns:p="http://schemas.openxmlformats.org/presentationml/2006/main">
+  <p:cSld>
+    <p:spTree>
+      <p:nvGrpSpPr>
+        <p:cNvPr id="1" name=""/>
+        <p:cNvGrpSpPr/>
+        <p:nvPr/>
+      </p:nvGrpSpPr>
+      <p:grpSpPr>
+        <a:xfrm>
+          <a:off x="0" y="0"/>
+          <a:ext cx="0" cy="0"/>
+          <a:chOff x="0" y="0"/>
+          <a:chExt cx="0" cy="0"/>
+        </a:xfrm>
+      </p:grpSpPr>
+      <p:sp>
+        <p:nvSpPr>
+          <p:cNvPr id="2" name="Title 1"/>
+          <p:cNvSpPr>
+            <a:spLocks noGrp="1"/>
+          </p:cNvSpPr>
+          <p:nvPr>
+            <p:ph type="title"/>
+          </p:nvPr>
+        </p:nvSpPr>
+        <p:spPr/>
+        <p:txBody>
+          <a:bodyPr/>
+          <a:lstStyle/>
+          <a:p>
+            <a:r>
+              <a:rPr lang="en-US" dirty="0" smtClean="0"/>
+              <a:t>Methodology – balancing the network</a:t>
+            </a:r>
+            <a:endParaRPr lang="en-US" dirty="0"/>
+          </a:p>
+        </p:txBody>
+      </p:sp>
+      <p:sp>
+        <p:nvSpPr>
+          <p:cNvPr id="3" name="Content Placeholder 2"/>
+          <p:cNvSpPr>
+            <a:spLocks noGrp="1"/>
+          </p:cNvSpPr>
+          <p:nvPr>
+            <p:ph idx="1"/>
+          </p:nvPr>
+        </p:nvSpPr>
+        <p:spPr/>
+        <p:txBody>
+          <a:bodyPr/>
+          <a:lstStyle/>
+          <a:p>
+            <a:r>
+              <a:rPr lang="en-US" dirty="0" smtClean="0"/>
+              <a:t>Network is balanced to see if it can satisfy all nodes</a:t>
+            </a:r>
+          </a:p>
+          <a:p>
+            <a:r>
+              <a:rPr lang="en-US" dirty="0" smtClean="0"/>
+              <a:t>We average all neighboring nodes until all of them are satisfied</a:t>
+            </a:r>
+          </a:p>
+          <a:p>
+            <a:pPr lvl="1"/>
+            <a:r>
+              <a:rPr lang="en-US" dirty="0" smtClean="0"/>
+              <a:t>Satisfied means energy available to them at the moment greater than 0</a:t>
+            </a:r>
+          </a:p>
+          <a:p>
+            <a:r>
+              <a:rPr lang="en-US" dirty="0" smtClean="0"/>
+              <a:t>Energy exchanged between the nodes cannot exceed connecting edge’s capacity</a:t>
+            </a:r>
+          </a:p>
+          <a:p>
+            <a:r>
+              <a:rPr lang="en-US" dirty="0" smtClean="0"/>
+              <a:t>If there is no change in subsequent steps, or maximum change in a step is very small, we determine that the network cannot be balanced</a:t>
+            </a:r>
+          </a:p>
+          <a:p>
+            <a:endParaRPr lang="en-US" dirty="0"/>
+          </a:p>
+        </p:txBody>
+      </p:sp>
+      <p:sp>
+        <p:nvSpPr>
+          <p:cNvPr id="4" name="Date Placeholder 3"/>
+          <p:cNvSpPr>
+            <a:spLocks noGrp="1"/>
+          </p:cNvSpPr>
+          <p:nvPr>
+            <p:ph type="dt" sz="half" idx="10"/>
+          </p:nvPr>
+        </p:nvSpPr>
+        <p:spPr/>
+        <p:txBody>
+          <a:bodyPr/>
+          <a:lstStyle/>
+          <a:p>
+            <a:r>
+              <a:rPr lang="pl-PL" smtClean="0"/>
+              <a:t>18/03/2016</a:t>
+            </a:r>
+            <a:endParaRPr lang="en-US"/>
+          </a:p>
+        </p:txBody>
+      </p:sp>
+      <p:sp>
+        <p:nvSpPr>
+          <p:cNvPr id="5" name="Footer Placeholder 4"/>
+          <p:cNvSpPr>
+            <a:spLocks noGrp="1"/>
+          </p:cNvSpPr>
+          <p:nvPr>
+            <p:ph type="ftr" sz="quarter" idx="11"/>
+          </p:nvPr>
+        </p:nvSpPr>
+        <p:spPr/>
+        <p:txBody>
+          <a:bodyPr/>
+          <a:lstStyle/>
+          <a:p>
+            <a:r>
+              <a:rPr lang="en-US" smtClean="0"/>
+              <a:t>Mateusz Iwo Dubaniowski</a:t>
+            </a:r>
+            <a:endParaRPr lang="en-US"/>
+          </a:p>
+        </p:txBody>
+      </p:sp>
+      <p:sp>
+        <p:nvSpPr>
+          <p:cNvPr id="6" name="Slide Number Placeholder 5"/>
+          <p:cNvSpPr>
+            <a:spLocks noGrp="1"/>
+          </p:cNvSpPr>
+          <p:nvPr>
+            <p:ph type="sldNum" sz="quarter" idx="12"/>
+          </p:nvPr>
+        </p:nvSpPr>
+        <p:spPr/>
+        <p:txBody>
+          <a:bodyPr/>
+          <a:lstStyle/>
+          <a:p>
+            <a:fld id="{F2F669FB-DEBD-724A-B581-DA343F7DE862}" type="slidenum">
+              <a:rPr lang="en-US" smtClean="0"/>
+              <a:t>7</a:t>
+            </a:fld>
+            <a:endParaRPr lang="en-US"/>
+          </a:p>
+        </p:txBody>
+      </p:sp>
+    </p:spTree>
+    <p:extLst>
+      <p:ext uri="{BB962C8B-B14F-4D97-AF65-F5344CB8AC3E}">
+        <p14:creationId xmlns:p14="http://schemas.microsoft.com/office/powerpoint/2010/main" val="4088596791"/>
+      </p:ext>
+    </p:extLst>
+  </p:cSld>
+  <p:clrMapOvr>
+    <a:masterClrMapping/>
+  </p:clrMapOvr>
+  <p:transition xmlns:p14="http://schemas.microsoft.com/office/powerpoint/2010/main">
+    <p:fade/>
+  </p:transition>
+</p:sld>
+</file>
+
+<file path=ppt/slides/slide8.xml><?xml version="1.0" encoding="utf-8"?>
+<p:sld xmlns:a="http://schemas.openxmlformats.org/drawingml/2006/main" xmlns:r="http://schemas.openxmlformats.org/officeDocument/2006/relationships" xmlns:p="http://schemas.openxmlformats.org/presentationml/2006/main">
+  <p:cSld>
+    <p:spTree>
+      <p:nvGrpSpPr>
+        <p:cNvPr id="1" name=""/>
+        <p:cNvGrpSpPr/>
+        <p:nvPr/>
+      </p:nvGrpSpPr>
+      <p:grpSpPr>
+        <a:xfrm>
+          <a:off x="0" y="0"/>
+          <a:ext cx="0" cy="0"/>
+          <a:chOff x="0" y="0"/>
+          <a:chExt cx="0" cy="0"/>
+        </a:xfrm>
+      </p:grpSpPr>
+      <p:sp>
+        <p:nvSpPr>
+          <p:cNvPr id="2" name="Title 1"/>
+          <p:cNvSpPr>
+            <a:spLocks noGrp="1"/>
+          </p:cNvSpPr>
+          <p:nvPr>
+            <p:ph type="title"/>
+          </p:nvPr>
+        </p:nvSpPr>
+        <p:spPr/>
+        <p:txBody>
+          <a:bodyPr/>
+          <a:lstStyle/>
+          <a:p>
+            <a:r>
+              <a:rPr lang="en-US" dirty="0" smtClean="0"/>
+              <a:t>Results</a:t>
+            </a:r>
+            <a:endParaRPr lang="en-US" dirty="0"/>
+          </a:p>
+        </p:txBody>
+      </p:sp>
+      <p:sp>
+        <p:nvSpPr>
+          <p:cNvPr id="3" name="Content Placeholder 2"/>
+          <p:cNvSpPr>
+            <a:spLocks noGrp="1"/>
+          </p:cNvSpPr>
+          <p:nvPr>
+            <p:ph idx="1"/>
+          </p:nvPr>
+        </p:nvSpPr>
+        <p:spPr>
+          <a:xfrm>
+            <a:off x="323850" y="1646566"/>
+            <a:ext cx="8496300" cy="4587544"/>
+          </a:xfrm>
+        </p:spPr>
+        <p:txBody>
+          <a:bodyPr/>
+          <a:lstStyle/>
+          <a:p>
+            <a:r>
+              <a:rPr lang="en-US" dirty="0" smtClean="0"/>
+              <a:t>We present various statistics on the networks after balancing both before and after disruption</a:t>
+            </a:r>
+          </a:p>
+          <a:p>
+            <a:r>
+              <a:rPr lang="en-US" dirty="0" smtClean="0"/>
+              <a:t>The following statistics are presented:</a:t>
+            </a:r>
+          </a:p>
+          <a:p>
+            <a:pPr lvl="1"/>
+            <a:r>
+              <a:rPr lang="en-US" dirty="0" smtClean="0"/>
+              <a:t>Net energy value – how much energy is unused in the system</a:t>
+            </a:r>
+          </a:p>
+          <a:p>
+            <a:pPr lvl="1"/>
+            <a:r>
+              <a:rPr lang="en-US" dirty="0" smtClean="0"/>
+              <a:t>Total energy produced</a:t>
+            </a:r>
+          </a:p>
+          <a:p>
+            <a:pPr lvl="1"/>
+            <a:r>
+              <a:rPr lang="en-US" dirty="0" smtClean="0"/>
+              <a:t>Total energy consumed</a:t>
+            </a:r>
+          </a:p>
+          <a:p>
+            <a:pPr lvl="1"/>
+            <a:r>
+              <a:rPr lang="en-US" dirty="0" smtClean="0"/>
+              <a:t>Average edge bandwidth – mean capacity of an edge</a:t>
+            </a:r>
+          </a:p>
+          <a:p>
+            <a:pPr lvl="1"/>
+            <a:r>
+              <a:rPr lang="en-US" dirty="0" smtClean="0"/>
+              <a:t>Average initial min. edge bandwidth – Total energy produced/number of edges</a:t>
+            </a:r>
+          </a:p>
+          <a:p>
+            <a:pPr lvl="1"/>
+            <a:r>
+              <a:rPr lang="en-US" dirty="0" smtClean="0"/>
+              <a:t>Extra bandwidth available in the network – Total capacity of edges – Used capacity of edges</a:t>
+            </a:r>
+          </a:p>
+          <a:p>
+            <a:pPr lvl="1"/>
+            <a:r>
+              <a:rPr lang="en-US" dirty="0" smtClean="0"/>
+              <a:t>Edges close to or at </a:t>
+            </a:r>
+            <a:r>
+              <a:rPr lang="en-US" dirty="0" err="1" smtClean="0"/>
+              <a:t>peakBandwidth</a:t>
+            </a:r>
+            <a:r>
+              <a:rPr lang="en-US" dirty="0" smtClean="0"/>
+              <a:t> – Edges which transfer more than 90% of their capacity – these are potentially critical edges</a:t>
+            </a:r>
+            <a:endParaRPr lang="en-US" dirty="0"/>
+          </a:p>
+        </p:txBody>
+      </p:sp>
+      <p:sp>
+        <p:nvSpPr>
+          <p:cNvPr id="4" name="Date Placeholder 3"/>
+          <p:cNvSpPr>
+            <a:spLocks noGrp="1"/>
+          </p:cNvSpPr>
+          <p:nvPr>
+            <p:ph type="dt" sz="half" idx="10"/>
+          </p:nvPr>
+        </p:nvSpPr>
+        <p:spPr/>
+        <p:txBody>
+          <a:bodyPr/>
+          <a:lstStyle/>
+          <a:p>
+            <a:r>
+              <a:rPr lang="pl-PL" smtClean="0"/>
+              <a:t>18/03/2016</a:t>
+            </a:r>
+            <a:endParaRPr lang="en-US"/>
+          </a:p>
+        </p:txBody>
+      </p:sp>
+      <p:sp>
+        <p:nvSpPr>
+          <p:cNvPr id="5" name="Footer Placeholder 4"/>
+          <p:cNvSpPr>
+            <a:spLocks noGrp="1"/>
+          </p:cNvSpPr>
+          <p:nvPr>
+            <p:ph type="ftr" sz="quarter" idx="11"/>
+          </p:nvPr>
+        </p:nvSpPr>
+        <p:spPr/>
+        <p:txBody>
+          <a:bodyPr/>
+          <a:lstStyle/>
+          <a:p>
+            <a:r>
+              <a:rPr lang="en-US" smtClean="0"/>
+              <a:t>Mateusz Iwo Dubaniowski</a:t>
+            </a:r>
+            <a:endParaRPr lang="en-US"/>
+          </a:p>
+        </p:txBody>
+      </p:sp>
+      <p:sp>
+        <p:nvSpPr>
+          <p:cNvPr id="6" name="Slide Number Placeholder 5"/>
+          <p:cNvSpPr>
+            <a:spLocks noGrp="1"/>
+          </p:cNvSpPr>
+          <p:nvPr>
+            <p:ph type="sldNum" sz="quarter" idx="12"/>
+          </p:nvPr>
+        </p:nvSpPr>
+        <p:spPr/>
+        <p:txBody>
+          <a:bodyPr/>
+          <a:lstStyle/>
+          <a:p>
+            <a:fld id="{F2F669FB-DEBD-724A-B581-DA343F7DE862}" type="slidenum">
+              <a:rPr lang="en-US" smtClean="0"/>
+              <a:t>8</a:t>
+            </a:fld>
+            <a:endParaRPr lang="en-US"/>
+          </a:p>
+        </p:txBody>
+      </p:sp>
+    </p:spTree>
+    <p:extLst>
+      <p:ext uri="{BB962C8B-B14F-4D97-AF65-F5344CB8AC3E}">
+        <p14:creationId xmlns:p14="http://schemas.microsoft.com/office/powerpoint/2010/main" val="3993905794"/>
+      </p:ext>
+    </p:extLst>
+  </p:cSld>
+  <p:clrMapOvr>
+    <a:masterClrMapping/>
+  </p:clrMapOvr>
+  <p:transition xmlns:p14="http://schemas.microsoft.com/office/powerpoint/2010/main">
+    <p:fade/>
+  </p:transition>
+</p:sld>
+</file>
+
+<file path=ppt/slides/slide9.xml><?xml version="1.0" encoding="utf-8"?>
+<p:sld xmlns:a="http://schemas.openxmlformats.org/drawingml/2006/main" xmlns:r="http://schemas.openxmlformats.org/officeDocument/2006/relationships" xmlns:p="http://schemas.openxmlformats.org/presentationml/2006/main">
+  <p:cSld>
+    <p:spTree>
+      <p:nvGrpSpPr>
+        <p:cNvPr id="1" name=""/>
+        <p:cNvGrpSpPr/>
+        <p:nvPr/>
+      </p:nvGrpSpPr>
+      <p:grpSpPr>
+        <a:xfrm>
+          <a:off x="0" y="0"/>
+          <a:ext cx="0" cy="0"/>
+          <a:chOff x="0" y="0"/>
+          <a:chExt cx="0" cy="0"/>
+        </a:xfrm>
+      </p:grpSpPr>
+      <p:sp>
+        <p:nvSpPr>
+          <p:cNvPr id="7" name="Content Placeholder 6"/>
+          <p:cNvSpPr>
+            <a:spLocks noGrp="1"/>
+          </p:cNvSpPr>
+          <p:nvPr>
+            <p:ph sz="half" idx="1"/>
+          </p:nvPr>
+        </p:nvSpPr>
+        <p:spPr/>
+        <p:txBody>
+          <a:bodyPr/>
+          <a:lstStyle/>
+          <a:p>
+            <a:pPr marL="0" indent="0">
+              <a:buNone/>
+            </a:pPr>
+            <a:r>
+              <a:rPr lang="en-US" dirty="0" smtClean="0"/>
+              <a:t>We also produce graph representations of the network.</a:t>
+            </a:r>
+          </a:p>
+          <a:p>
+            <a:pPr marL="0" indent="0">
+              <a:buNone/>
+            </a:pPr>
+            <a:r>
+              <a:rPr lang="en-US" dirty="0" smtClean="0">
+                <a:solidFill>
+                  <a:srgbClr val="008000"/>
+                </a:solidFill>
+              </a:rPr>
+              <a:t>Green</a:t>
+            </a:r>
+            <a:r>
+              <a:rPr lang="en-US" dirty="0" smtClean="0"/>
+              <a:t> nodes correspond to satisfied nodes</a:t>
+            </a:r>
+          </a:p>
+          <a:p>
+            <a:pPr marL="0" indent="0">
+              <a:buNone/>
+            </a:pPr>
+            <a:r>
+              <a:rPr lang="en-US" dirty="0" smtClean="0">
+                <a:solidFill>
+                  <a:srgbClr val="FF0000"/>
+                </a:solidFill>
+              </a:rPr>
+              <a:t>Red</a:t>
+            </a:r>
+            <a:r>
+              <a:rPr lang="en-US" dirty="0" smtClean="0"/>
+              <a:t> nodes correspond to unsatisfied with not enough electricity supplied to them nodes</a:t>
+            </a:r>
+            <a:endParaRPr lang="en-US" dirty="0"/>
+          </a:p>
+        </p:txBody>
+      </p:sp>
+      <p:pic>
+        <p:nvPicPr>
+          <p:cNvPr id="13" name="Content Placeholder 12" descr="Graph1.png"/>
+          <p:cNvPicPr>
+            <a:picLocks noGrp="1" noChangeAspect="1"/>
+          </p:cNvPicPr>
+          <p:nvPr>
+            <p:ph sz="half" idx="2"/>
+          </p:nvPr>
+        </p:nvPicPr>
+        <p:blipFill>
+          <a:blip r:embed="rId2">
+            <a:extLst>
+              <a:ext uri="{28A0092B-C50C-407E-A947-70E740481C1C}">
+                <a14:useLocalDpi xmlns:a14="http://schemas.microsoft.com/office/drawing/2010/main" val="0"/>
+              </a:ext>
+            </a:extLst>
+          </a:blip>
+          <a:srcRect l="1300" r="1300"/>
+          <a:stretch>
+            <a:fillRect/>
+          </a:stretch>
+        </p:blipFill>
+        <p:spPr/>
+      </p:pic>
+      <p:sp>
+        <p:nvSpPr>
+          <p:cNvPr id="4" name="Date Placeholder 3"/>
+          <p:cNvSpPr>
+            <a:spLocks noGrp="1"/>
+          </p:cNvSpPr>
+          <p:nvPr>
+            <p:ph type="dt" sz="half" idx="10"/>
+          </p:nvPr>
+        </p:nvSpPr>
+        <p:spPr/>
+        <p:txBody>
+          <a:bodyPr/>
+          <a:lstStyle/>
+          <a:p>
+            <a:r>
+              <a:rPr lang="pl-PL" smtClean="0"/>
+              <a:t>18/03/2016</a:t>
+            </a:r>
+            <a:endParaRPr lang="en-US"/>
+          </a:p>
+        </p:txBody>
+      </p:sp>
+      <p:sp>
+        <p:nvSpPr>
+          <p:cNvPr id="5" name="Footer Placeholder 4"/>
+          <p:cNvSpPr>
+            <a:spLocks noGrp="1"/>
+          </p:cNvSpPr>
+          <p:nvPr>
+            <p:ph type="ftr" sz="quarter" idx="11"/>
+          </p:nvPr>
+        </p:nvSpPr>
+        <p:spPr/>
+        <p:txBody>
+          <a:bodyPr/>
+          <a:lstStyle/>
+          <a:p>
+            <a:r>
+              <a:rPr lang="en-US" smtClean="0"/>
+              <a:t>Mateusz Iwo Dubaniowski</a:t>
+            </a:r>
+            <a:endParaRPr lang="en-US"/>
+          </a:p>
+        </p:txBody>
+      </p:sp>
+      <p:sp>
+        <p:nvSpPr>
+          <p:cNvPr id="6" name="Slide Number Placeholder 5"/>
+          <p:cNvSpPr>
+            <a:spLocks noGrp="1"/>
+          </p:cNvSpPr>
+          <p:nvPr>
+            <p:ph type="sldNum" sz="quarter" idx="12"/>
+          </p:nvPr>
+        </p:nvSpPr>
+        <p:spPr/>
+        <p:txBody>
+          <a:bodyPr/>
+          <a:lstStyle/>
+          <a:p>
+            <a:fld id="{F2F669FB-DEBD-724A-B581-DA343F7DE862}" type="slidenum">
+              <a:rPr lang="en-US" smtClean="0"/>
+              <a:t>9</a:t>
+            </a:fld>
+            <a:endParaRPr lang="en-US"/>
+          </a:p>
+        </p:txBody>
+      </p:sp>
+      <p:sp>
+        <p:nvSpPr>
+          <p:cNvPr id="2" name="Title 1"/>
+          <p:cNvSpPr>
+            <a:spLocks noGrp="1"/>
+          </p:cNvSpPr>
+          <p:nvPr>
+            <p:ph type="title"/>
+          </p:nvPr>
+        </p:nvSpPr>
+        <p:spPr/>
+        <p:txBody>
+          <a:bodyPr/>
+          <a:lstStyle/>
+          <a:p>
+            <a:r>
+              <a:rPr lang="en-US" dirty="0" smtClean="0"/>
+              <a:t>Screenshot</a:t>
+            </a:r>
+            <a:endParaRPr lang="en-US" dirty="0"/>
+          </a:p>
+        </p:txBody>
+      </p:sp>
+    </p:spTree>
+    <p:extLst>
+      <p:ext uri="{BB962C8B-B14F-4D97-AF65-F5344CB8AC3E}">
+        <p14:creationId xmlns:p14="http://schemas.microsoft.com/office/powerpoint/2010/main" val="2869425600"/>
+      </p:ext>
+    </p:extLst>
+  </p:cSld>
+  <p:clrMapOvr>
+    <a:masterClrMapping/>
+  </p:clrMapOvr>
+  <p:transition xmlns:p14="http://schemas.microsoft.com/office/powerpoint/2010/main">
+    <p:fade/>
+  </p:transition>
 </p:sld>
 </file>
 
@@ -3498,4 +6081,644 @@
     </a:ext>
   </a:extLst>
 </a:theme>
+</file>
+
+<file path=ppt/theme/theme2.xml><?xml version="1.0" encoding="utf-8"?>
+<a:theme xmlns:a="http://schemas.openxmlformats.org/drawingml/2006/main" name="Office Theme">
+  <a:themeElements>
+    <a:clrScheme name="Office">
+      <a:dk1>
+        <a:sysClr val="windowText" lastClr="000000"/>
+      </a:dk1>
+      <a:lt1>
+        <a:sysClr val="window" lastClr="FFFFFF"/>
+      </a:lt1>
+      <a:dk2>
+        <a:srgbClr val="1F497D"/>
+      </a:dk2>
+      <a:lt2>
+        <a:srgbClr val="EEECE1"/>
+      </a:lt2>
+      <a:accent1>
+        <a:srgbClr val="4F81BD"/>
+      </a:accent1>
+      <a:accent2>
+        <a:srgbClr val="C0504D"/>
+      </a:accent2>
+      <a:accent3>
+        <a:srgbClr val="9BBB59"/>
+      </a:accent3>
+      <a:accent4>
+        <a:srgbClr val="8064A2"/>
+      </a:accent4>
+      <a:accent5>
+        <a:srgbClr val="4BACC6"/>
+      </a:accent5>
+      <a:accent6>
+        <a:srgbClr val="F79646"/>
+      </a:accent6>
+      <a:hlink>
+        <a:srgbClr val="0000FF"/>
+      </a:hlink>
+      <a:folHlink>
+        <a:srgbClr val="800080"/>
+      </a:folHlink>
+    </a:clrScheme>
+    <a:fontScheme name="Office">
+      <a:majorFont>
+        <a:latin typeface="Calibri"/>
+        <a:ea typeface=""/>
+        <a:cs typeface=""/>
+        <a:font script="Jpan" typeface="ＭＳ Ｐゴシック"/>
+        <a:font script="Hang" typeface="맑은 고딕"/>
+        <a:font script="Hans" typeface="宋体"/>
+        <a:font script="Hant" typeface="新細明體"/>
+        <a:font script="Arab" typeface="Times New Roman"/>
+        <a:font script="Hebr" typeface="Times New Roman"/>
+        <a:font script="Thai" typeface="Angsana New"/>
+        <a:font script="Ethi" typeface="Nyala"/>
+        <a:font script="Beng" typeface="Vrinda"/>
+        <a:font script="Gujr" typeface="Shruti"/>
+        <a:font script="Khmr" typeface="MoolBoran"/>
+        <a:font script="Knda" typeface="Tunga"/>
+        <a:font script="Guru" typeface="Raavi"/>
+        <a:font script="Cans" typeface="Euphemia"/>
+        <a:font script="Cher" typeface="Plantagenet Cherokee"/>
+        <a:font script="Yiii" typeface="Microsoft Yi Baiti"/>
+        <a:font script="Tibt" typeface="Microsoft Himalaya"/>
+        <a:font script="Thaa" typeface="MV Boli"/>
+        <a:font script="Deva" typeface="Mangal"/>
+        <a:font script="Telu" typeface="Gautami"/>
+        <a:font script="Taml" typeface="Latha"/>
+        <a:font script="Syrc" typeface="Estrangelo Edessa"/>
+        <a:font script="Orya" typeface="Kalinga"/>
+        <a:font script="Mlym" typeface="Kartika"/>
+        <a:font script="Laoo" typeface="DokChampa"/>
+        <a:font script="Sinh" typeface="Iskoola Pota"/>
+        <a:font script="Mong" typeface="Mongolian Baiti"/>
+        <a:font script="Viet" typeface="Times New Roman"/>
+        <a:font script="Uigh" typeface="Microsoft Uighur"/>
+        <a:font script="Geor" typeface="Sylfaen"/>
+      </a:majorFont>
+      <a:minorFont>
+        <a:latin typeface="Calibri"/>
+        <a:ea typeface=""/>
+        <a:cs typeface=""/>
+        <a:font script="Jpan" typeface="ＭＳ Ｐゴシック"/>
+        <a:font script="Hang" typeface="맑은 고딕"/>
+        <a:font script="Hans" typeface="宋体"/>
+        <a:font script="Hant" typeface="新細明體"/>
+        <a:font script="Arab" typeface="Arial"/>
+        <a:font script="Hebr" typeface="Arial"/>
+        <a:font script="Thai" typeface="Cordia New"/>
+        <a:font script="Ethi" typeface="Nyala"/>
+        <a:font script="Beng" typeface="Vrinda"/>
+        <a:font script="Gujr" typeface="Shruti"/>
+        <a:font script="Khmr" typeface="DaunPenh"/>
+        <a:font script="Knda" typeface="Tunga"/>
+        <a:font script="Guru" typeface="Raavi"/>
+        <a:font script="Cans" typeface="Euphemia"/>
+        <a:font script="Cher" typeface="Plantagenet Cherokee"/>
+        <a:font script="Yiii" typeface="Microsoft Yi Baiti"/>
+        <a:font script="Tibt" typeface="Microsoft Himalaya"/>
+        <a:font script="Thaa" typeface="MV Boli"/>
+        <a:font script="Deva" typeface="Mangal"/>
+        <a:font script="Telu" typeface="Gautami"/>
+        <a:font script="Taml" typeface="Latha"/>
+        <a:font script="Syrc" typeface="Estrangelo Edessa"/>
+        <a:font script="Orya" typeface="Kalinga"/>
+        <a:font script="Mlym" typeface="Kartika"/>
+        <a:font script="Laoo" typeface="DokChampa"/>
+        <a:font script="Sinh" typeface="Iskoola Pota"/>
+        <a:font script="Mong" typeface="Mongolian Baiti"/>
+        <a:font script="Viet" typeface="Arial"/>
+        <a:font script="Uigh" typeface="Microsoft Uighur"/>
+        <a:font script="Geor" typeface="Sylfaen"/>
+      </a:minorFont>
+    </a:fontScheme>
+    <a:fmtScheme name="Office">
+      <a:fillStyleLst>
+        <a:solidFill>
+          <a:schemeClr val="phClr"/>
+        </a:solidFill>
+        <a:gradFill rotWithShape="1">
+          <a:gsLst>
+            <a:gs pos="0">
+              <a:schemeClr val="phClr">
+                <a:tint val="50000"/>
+                <a:satMod val="300000"/>
+              </a:schemeClr>
+            </a:gs>
+            <a:gs pos="35000">
+              <a:schemeClr val="phClr">
+                <a:tint val="37000"/>
+                <a:satMod val="300000"/>
+              </a:schemeClr>
+            </a:gs>
+            <a:gs pos="100000">
+              <a:schemeClr val="phClr">
+                <a:tint val="15000"/>
+                <a:satMod val="350000"/>
+              </a:schemeClr>
+            </a:gs>
+          </a:gsLst>
+          <a:lin ang="16200000" scaled="1"/>
+        </a:gradFill>
+        <a:gradFill rotWithShape="1">
+          <a:gsLst>
+            <a:gs pos="0">
+              <a:schemeClr val="phClr">
+                <a:tint val="100000"/>
+                <a:shade val="100000"/>
+                <a:satMod val="130000"/>
+              </a:schemeClr>
+            </a:gs>
+            <a:gs pos="100000">
+              <a:schemeClr val="phClr">
+                <a:tint val="50000"/>
+                <a:shade val="100000"/>
+                <a:satMod val="350000"/>
+              </a:schemeClr>
+            </a:gs>
+          </a:gsLst>
+          <a:lin ang="16200000" scaled="0"/>
+        </a:gradFill>
+      </a:fillStyleLst>
+      <a:lnStyleLst>
+        <a:ln w="9525" cap="flat" cmpd="sng" algn="ctr">
+          <a:solidFill>
+            <a:schemeClr val="phClr">
+              <a:shade val="95000"/>
+              <a:satMod val="105000"/>
+            </a:schemeClr>
+          </a:solidFill>
+          <a:prstDash val="solid"/>
+        </a:ln>
+        <a:ln w="25400" cap="flat" cmpd="sng" algn="ctr">
+          <a:solidFill>
+            <a:schemeClr val="phClr"/>
+          </a:solidFill>
+          <a:prstDash val="solid"/>
+        </a:ln>
+        <a:ln w="38100" cap="flat" cmpd="sng" algn="ctr">
+          <a:solidFill>
+            <a:schemeClr val="phClr"/>
+          </a:solidFill>
+          <a:prstDash val="solid"/>
+        </a:ln>
+      </a:lnStyleLst>
+      <a:effectStyleLst>
+        <a:effectStyle>
+          <a:effectLst>
+            <a:outerShdw blurRad="40000" dist="20000" dir="5400000" rotWithShape="0">
+              <a:srgbClr val="000000">
+                <a:alpha val="38000"/>
+              </a:srgbClr>
+            </a:outerShdw>
+          </a:effectLst>
+        </a:effectStyle>
+        <a:effectStyle>
+          <a:effectLst>
+            <a:outerShdw blurRad="40000" dist="23000" dir="5400000" rotWithShape="0">
+              <a:srgbClr val="000000">
+                <a:alpha val="35000"/>
+              </a:srgbClr>
+            </a:outerShdw>
+          </a:effectLst>
+        </a:effectStyle>
+        <a:effectStyle>
+          <a:effectLst>
+            <a:outerShdw blurRad="40000" dist="23000" dir="5400000" rotWithShape="0">
+              <a:srgbClr val="000000">
+                <a:alpha val="35000"/>
+              </a:srgbClr>
+            </a:outerShdw>
+          </a:effectLst>
+          <a:scene3d>
+            <a:camera prst="orthographicFront">
+              <a:rot lat="0" lon="0" rev="0"/>
+            </a:camera>
+            <a:lightRig rig="threePt" dir="t">
+              <a:rot lat="0" lon="0" rev="1200000"/>
+            </a:lightRig>
+          </a:scene3d>
+          <a:sp3d>
+            <a:bevelT w="63500" h="25400"/>
+          </a:sp3d>
+        </a:effectStyle>
+      </a:effectStyleLst>
+      <a:bgFillStyleLst>
+        <a:solidFill>
+          <a:schemeClr val="phClr"/>
+        </a:solidFill>
+        <a:gradFill rotWithShape="1">
+          <a:gsLst>
+            <a:gs pos="0">
+              <a:schemeClr val="phClr">
+                <a:tint val="40000"/>
+                <a:satMod val="350000"/>
+              </a:schemeClr>
+            </a:gs>
+            <a:gs pos="40000">
+              <a:schemeClr val="phClr">
+                <a:tint val="45000"/>
+                <a:shade val="99000"/>
+                <a:satMod val="350000"/>
+              </a:schemeClr>
+            </a:gs>
+            <a:gs pos="100000">
+              <a:schemeClr val="phClr">
+                <a:shade val="20000"/>
+                <a:satMod val="255000"/>
+              </a:schemeClr>
+            </a:gs>
+          </a:gsLst>
+          <a:path path="circle">
+            <a:fillToRect l="50000" t="-80000" r="50000" b="180000"/>
+          </a:path>
+        </a:gradFill>
+        <a:gradFill rotWithShape="1">
+          <a:gsLst>
+            <a:gs pos="0">
+              <a:schemeClr val="phClr">
+                <a:tint val="80000"/>
+                <a:satMod val="300000"/>
+              </a:schemeClr>
+            </a:gs>
+            <a:gs pos="100000">
+              <a:schemeClr val="phClr">
+                <a:shade val="30000"/>
+                <a:satMod val="200000"/>
+              </a:schemeClr>
+            </a:gs>
+          </a:gsLst>
+          <a:path path="circle">
+            <a:fillToRect l="50000" t="50000" r="50000" b="50000"/>
+          </a:path>
+        </a:gradFill>
+      </a:bgFillStyleLst>
+    </a:fmtScheme>
+  </a:themeElements>
+  <a:objectDefaults>
+    <a:spDef>
+      <a:spPr/>
+      <a:bodyPr/>
+      <a:lstStyle/>
+      <a:style>
+        <a:lnRef idx="1">
+          <a:schemeClr val="accent1"/>
+        </a:lnRef>
+        <a:fillRef idx="3">
+          <a:schemeClr val="accent1"/>
+        </a:fillRef>
+        <a:effectRef idx="2">
+          <a:schemeClr val="accent1"/>
+        </a:effectRef>
+        <a:fontRef idx="minor">
+          <a:schemeClr val="lt1"/>
+        </a:fontRef>
+      </a:style>
+    </a:spDef>
+    <a:lnDef>
+      <a:spPr/>
+      <a:bodyPr/>
+      <a:lstStyle/>
+      <a:style>
+        <a:lnRef idx="2">
+          <a:schemeClr val="accent1"/>
+        </a:lnRef>
+        <a:fillRef idx="0">
+          <a:schemeClr val="accent1"/>
+        </a:fillRef>
+        <a:effectRef idx="1">
+          <a:schemeClr val="accent1"/>
+        </a:effectRef>
+        <a:fontRef idx="minor">
+          <a:schemeClr val="tx1"/>
+        </a:fontRef>
+      </a:style>
+    </a:lnDef>
+  </a:objectDefaults>
+  <a:extraClrSchemeLst/>
+</a:theme>
+</file>
+
+<file path=ppt/theme/theme3.xml><?xml version="1.0" encoding="utf-8"?>
+<a:theme xmlns:a="http://schemas.openxmlformats.org/drawingml/2006/main" name="Office Theme">
+  <a:themeElements>
+    <a:clrScheme name="Office">
+      <a:dk1>
+        <a:sysClr val="windowText" lastClr="000000"/>
+      </a:dk1>
+      <a:lt1>
+        <a:sysClr val="window" lastClr="FFFFFF"/>
+      </a:lt1>
+      <a:dk2>
+        <a:srgbClr val="1F497D"/>
+      </a:dk2>
+      <a:lt2>
+        <a:srgbClr val="EEECE1"/>
+      </a:lt2>
+      <a:accent1>
+        <a:srgbClr val="4F81BD"/>
+      </a:accent1>
+      <a:accent2>
+        <a:srgbClr val="C0504D"/>
+      </a:accent2>
+      <a:accent3>
+        <a:srgbClr val="9BBB59"/>
+      </a:accent3>
+      <a:accent4>
+        <a:srgbClr val="8064A2"/>
+      </a:accent4>
+      <a:accent5>
+        <a:srgbClr val="4BACC6"/>
+      </a:accent5>
+      <a:accent6>
+        <a:srgbClr val="F79646"/>
+      </a:accent6>
+      <a:hlink>
+        <a:srgbClr val="0000FF"/>
+      </a:hlink>
+      <a:folHlink>
+        <a:srgbClr val="800080"/>
+      </a:folHlink>
+    </a:clrScheme>
+    <a:fontScheme name="Office">
+      <a:majorFont>
+        <a:latin typeface="Calibri"/>
+        <a:ea typeface=""/>
+        <a:cs typeface=""/>
+        <a:font script="Jpan" typeface="ＭＳ Ｐゴシック"/>
+        <a:font script="Hang" typeface="맑은 고딕"/>
+        <a:font script="Hans" typeface="宋体"/>
+        <a:font script="Hant" typeface="新細明體"/>
+        <a:font script="Arab" typeface="Times New Roman"/>
+        <a:font script="Hebr" typeface="Times New Roman"/>
+        <a:font script="Thai" typeface="Angsana New"/>
+        <a:font script="Ethi" typeface="Nyala"/>
+        <a:font script="Beng" typeface="Vrinda"/>
+        <a:font script="Gujr" typeface="Shruti"/>
+        <a:font script="Khmr" typeface="MoolBoran"/>
+        <a:font script="Knda" typeface="Tunga"/>
+        <a:font script="Guru" typeface="Raavi"/>
+        <a:font script="Cans" typeface="Euphemia"/>
+        <a:font script="Cher" typeface="Plantagenet Cherokee"/>
+        <a:font script="Yiii" typeface="Microsoft Yi Baiti"/>
+        <a:font script="Tibt" typeface="Microsoft Himalaya"/>
+        <a:font script="Thaa" typeface="MV Boli"/>
+        <a:font script="Deva" typeface="Mangal"/>
+        <a:font script="Telu" typeface="Gautami"/>
+        <a:font script="Taml" typeface="Latha"/>
+        <a:font script="Syrc" typeface="Estrangelo Edessa"/>
+        <a:font script="Orya" typeface="Kalinga"/>
+        <a:font script="Mlym" typeface="Kartika"/>
+        <a:font script="Laoo" typeface="DokChampa"/>
+        <a:font script="Sinh" typeface="Iskoola Pota"/>
+        <a:font script="Mong" typeface="Mongolian Baiti"/>
+        <a:font script="Viet" typeface="Times New Roman"/>
+        <a:font script="Uigh" typeface="Microsoft Uighur"/>
+        <a:font script="Geor" typeface="Sylfaen"/>
+      </a:majorFont>
+      <a:minorFont>
+        <a:latin typeface="Calibri"/>
+        <a:ea typeface=""/>
+        <a:cs typeface=""/>
+        <a:font script="Jpan" typeface="ＭＳ Ｐゴシック"/>
+        <a:font script="Hang" typeface="맑은 고딕"/>
+        <a:font script="Hans" typeface="宋体"/>
+        <a:font script="Hant" typeface="新細明體"/>
+        <a:font script="Arab" typeface="Arial"/>
+        <a:font script="Hebr" typeface="Arial"/>
+        <a:font script="Thai" typeface="Cordia New"/>
+        <a:font script="Ethi" typeface="Nyala"/>
+        <a:font script="Beng" typeface="Vrinda"/>
+        <a:font script="Gujr" typeface="Shruti"/>
+        <a:font script="Khmr" typeface="DaunPenh"/>
+        <a:font script="Knda" typeface="Tunga"/>
+        <a:font script="Guru" typeface="Raavi"/>
+        <a:font script="Cans" typeface="Euphemia"/>
+        <a:font script="Cher" typeface="Plantagenet Cherokee"/>
+        <a:font script="Yiii" typeface="Microsoft Yi Baiti"/>
+        <a:font script="Tibt" typeface="Microsoft Himalaya"/>
+        <a:font script="Thaa" typeface="MV Boli"/>
+        <a:font script="Deva" typeface="Mangal"/>
+        <a:font script="Telu" typeface="Gautami"/>
+        <a:font script="Taml" typeface="Latha"/>
+        <a:font script="Syrc" typeface="Estrangelo Edessa"/>
+        <a:font script="Orya" typeface="Kalinga"/>
+        <a:font script="Mlym" typeface="Kartika"/>
+        <a:font script="Laoo" typeface="DokChampa"/>
+        <a:font script="Sinh" typeface="Iskoola Pota"/>
+        <a:font script="Mong" typeface="Mongolian Baiti"/>
+        <a:font script="Viet" typeface="Arial"/>
+        <a:font script="Uigh" typeface="Microsoft Uighur"/>
+        <a:font script="Geor" typeface="Sylfaen"/>
+      </a:minorFont>
+    </a:fontScheme>
+    <a:fmtScheme name="Office">
+      <a:fillStyleLst>
+        <a:solidFill>
+          <a:schemeClr val="phClr"/>
+        </a:solidFill>
+        <a:gradFill rotWithShape="1">
+          <a:gsLst>
+            <a:gs pos="0">
+              <a:schemeClr val="phClr">
+                <a:tint val="50000"/>
+                <a:satMod val="300000"/>
+              </a:schemeClr>
+            </a:gs>
+            <a:gs pos="35000">
+              <a:schemeClr val="phClr">
+                <a:tint val="37000"/>
+                <a:satMod val="300000"/>
+              </a:schemeClr>
+            </a:gs>
+            <a:gs pos="100000">
+              <a:schemeClr val="phClr">
+                <a:tint val="15000"/>
+                <a:satMod val="350000"/>
+              </a:schemeClr>
+            </a:gs>
+          </a:gsLst>
+          <a:lin ang="16200000" scaled="1"/>
+        </a:gradFill>
+        <a:gradFill rotWithShape="1">
+          <a:gsLst>
+            <a:gs pos="0">
+              <a:schemeClr val="phClr">
+                <a:tint val="100000"/>
+                <a:shade val="100000"/>
+                <a:satMod val="130000"/>
+              </a:schemeClr>
+            </a:gs>
+            <a:gs pos="100000">
+              <a:schemeClr val="phClr">
+                <a:tint val="50000"/>
+                <a:shade val="100000"/>
+                <a:satMod val="350000"/>
+              </a:schemeClr>
+            </a:gs>
+          </a:gsLst>
+          <a:lin ang="16200000" scaled="0"/>
+        </a:gradFill>
+      </a:fillStyleLst>
+      <a:lnStyleLst>
+        <a:ln w="9525" cap="flat" cmpd="sng" algn="ctr">
+          <a:solidFill>
+            <a:schemeClr val="phClr">
+              <a:shade val="95000"/>
+              <a:satMod val="105000"/>
+            </a:schemeClr>
+          </a:solidFill>
+          <a:prstDash val="solid"/>
+        </a:ln>
+        <a:ln w="25400" cap="flat" cmpd="sng" algn="ctr">
+          <a:solidFill>
+            <a:schemeClr val="phClr"/>
+          </a:solidFill>
+          <a:prstDash val="solid"/>
+        </a:ln>
+        <a:ln w="38100" cap="flat" cmpd="sng" algn="ctr">
+          <a:solidFill>
+            <a:schemeClr val="phClr"/>
+          </a:solidFill>
+          <a:prstDash val="solid"/>
+        </a:ln>
+      </a:lnStyleLst>
+      <a:effectStyleLst>
+        <a:effectStyle>
+          <a:effectLst>
+            <a:outerShdw blurRad="40000" dist="20000" dir="5400000" rotWithShape="0">
+              <a:srgbClr val="000000">
+                <a:alpha val="38000"/>
+              </a:srgbClr>
+            </a:outerShdw>
+          </a:effectLst>
+        </a:effectStyle>
+        <a:effectStyle>
+          <a:effectLst>
+            <a:outerShdw blurRad="40000" dist="23000" dir="5400000" rotWithShape="0">
+              <a:srgbClr val="000000">
+                <a:alpha val="35000"/>
+              </a:srgbClr>
+            </a:outerShdw>
+          </a:effectLst>
+        </a:effectStyle>
+        <a:effectStyle>
+          <a:effectLst>
+            <a:outerShdw blurRad="40000" dist="23000" dir="5400000" rotWithShape="0">
+              <a:srgbClr val="000000">
+                <a:alpha val="35000"/>
+              </a:srgbClr>
+            </a:outerShdw>
+          </a:effectLst>
+          <a:scene3d>
+            <a:camera prst="orthographicFront">
+              <a:rot lat="0" lon="0" rev="0"/>
+            </a:camera>
+            <a:lightRig rig="threePt" dir="t">
+              <a:rot lat="0" lon="0" rev="1200000"/>
+            </a:lightRig>
+          </a:scene3d>
+          <a:sp3d>
+            <a:bevelT w="63500" h="25400"/>
+          </a:sp3d>
+        </a:effectStyle>
+      </a:effectStyleLst>
+      <a:bgFillStyleLst>
+        <a:solidFill>
+          <a:schemeClr val="phClr"/>
+        </a:solidFill>
+        <a:gradFill rotWithShape="1">
+          <a:gsLst>
+            <a:gs pos="0">
+              <a:schemeClr val="phClr">
+                <a:tint val="40000"/>
+                <a:satMod val="350000"/>
+              </a:schemeClr>
+            </a:gs>
+            <a:gs pos="40000">
+              <a:schemeClr val="phClr">
+                <a:tint val="45000"/>
+                <a:shade val="99000"/>
+                <a:satMod val="350000"/>
+              </a:schemeClr>
+            </a:gs>
+            <a:gs pos="100000">
+              <a:schemeClr val="phClr">
+                <a:shade val="20000"/>
+                <a:satMod val="255000"/>
+              </a:schemeClr>
+            </a:gs>
+          </a:gsLst>
+          <a:path path="circle">
+            <a:fillToRect l="50000" t="-80000" r="50000" b="180000"/>
+          </a:path>
+        </a:gradFill>
+        <a:gradFill rotWithShape="1">
+          <a:gsLst>
+            <a:gs pos="0">
+              <a:schemeClr val="phClr">
+                <a:tint val="80000"/>
+                <a:satMod val="300000"/>
+              </a:schemeClr>
+            </a:gs>
+            <a:gs pos="100000">
+              <a:schemeClr val="phClr">
+                <a:shade val="30000"/>
+                <a:satMod val="200000"/>
+              </a:schemeClr>
+            </a:gs>
+          </a:gsLst>
+          <a:path path="circle">
+            <a:fillToRect l="50000" t="50000" r="50000" b="50000"/>
+          </a:path>
+        </a:gradFill>
+      </a:bgFillStyleLst>
+    </a:fmtScheme>
+  </a:themeElements>
+  <a:objectDefaults>
+    <a:spDef>
+      <a:spPr/>
+      <a:bodyPr/>
+      <a:lstStyle/>
+      <a:style>
+        <a:lnRef idx="1">
+          <a:schemeClr val="accent1"/>
+        </a:lnRef>
+        <a:fillRef idx="3">
+          <a:schemeClr val="accent1"/>
+        </a:fillRef>
+        <a:effectRef idx="2">
+          <a:schemeClr val="accent1"/>
+        </a:effectRef>
+        <a:fontRef idx="minor">
+          <a:schemeClr val="lt1"/>
+        </a:fontRef>
+      </a:style>
+    </a:spDef>
+    <a:lnDef>
+      <a:spPr/>
+      <a:bodyPr/>
+      <a:lstStyle/>
+      <a:style>
+        <a:lnRef idx="2">
+          <a:schemeClr val="accent1"/>
+        </a:lnRef>
+        <a:fillRef idx="0">
+          <a:schemeClr val="accent1"/>
+        </a:fillRef>
+        <a:effectRef idx="1">
+          <a:schemeClr val="accent1"/>
+        </a:effectRef>
+        <a:fontRef idx="minor">
+          <a:schemeClr val="tx1"/>
+        </a:fontRef>
+      </a:style>
+    </a:lnDef>
+  </a:objectDefaults>
+  <a:extraClrSchemeLst/>
+</a:theme>
 </file>
</xml_diff>

<commit_message>
Presentation checked and updated
</commit_message>
<xml_diff>
--- a/FinalPresentation.pptx
+++ b/FinalPresentation.pptx
@@ -205,7 +205,7 @@
           <a:p>
             <a:fld id="{3F4692F3-3FEA-1449-97AE-0B5AA74E454F}" type="datetimeFigureOut">
               <a:rPr lang="en-US" smtClean="0"/>
-              <a:t>16/3/16</a:t>
+              <a:t>17/3/16</a:t>
             </a:fld>
             <a:endParaRPr lang="en-US"/>
           </a:p>
@@ -371,7 +371,7 @@
           <a:p>
             <a:fld id="{A7A7E92D-2E81-674B-9A4C-1F4E757895E9}" type="datetimeFigureOut">
               <a:rPr lang="en-US" smtClean="0"/>
-              <a:t>16/3/16</a:t>
+              <a:t>17/3/16</a:t>
             </a:fld>
             <a:endParaRPr lang="en-US"/>
           </a:p>
@@ -3311,7 +3311,7 @@
           <a:graphicData uri="http://schemas.openxmlformats.org/presentationml/2006/ole">
             <mc:AlternateContent xmlns:mc="http://schemas.openxmlformats.org/markup-compatibility/2006">
               <mc:Choice xmlns:v="urn:schemas-microsoft-com:vml" Requires="v">
-                <p:oleObj spid="_x0000_s1061" name="Corel DESIGNER" r:id="rId15" imgW="6882717" imgH="1850040" progId="CorelDESIGNER.Graphic.16">
+                <p:oleObj spid="_x0000_s1086" name="Corel DESIGNER" r:id="rId15" imgW="6882717" imgH="1850040" progId="CorelDESIGNER.Graphic.16">
                   <p:embed/>
                 </p:oleObj>
               </mc:Choice>
@@ -3721,7 +3721,11 @@
             <a:pPr algn="ctr"/>
             <a:r>
               <a:rPr lang="en-US" dirty="0" smtClean="0"/>
-              <a:t>Modeling US power grid network disruptions</a:t>
+              <a:t>Modeling </a:t>
+            </a:r>
+            <a:r>
+              <a:rPr lang="en-US" dirty="0" smtClean="0"/>
+              <a:t>US power grid network disruptions</a:t>
             </a:r>
             <a:endParaRPr lang="en-US" dirty="0"/>
           </a:p>
@@ -3901,8 +3905,29 @@
           <a:p>
             <a:r>
               <a:rPr lang="en-US" dirty="0" smtClean="0"/>
-              <a:t>Moreover, we we can try what is the performance of a network as edge or node capacity only decreases</a:t>
-            </a:r>
+              <a:t>Moreover, we </a:t>
+            </a:r>
+            <a:r>
+              <a:rPr lang="en-US" dirty="0" smtClean="0"/>
+              <a:t>can investigate what the </a:t>
+            </a:r>
+            <a:r>
+              <a:rPr lang="en-US" dirty="0" smtClean="0"/>
+              <a:t>performance of a </a:t>
+            </a:r>
+            <a:r>
+              <a:rPr lang="en-US" dirty="0" smtClean="0"/>
+              <a:t>network is </a:t>
+            </a:r>
+            <a:r>
+              <a:rPr lang="en-US" dirty="0" smtClean="0"/>
+              <a:t>as edge or node </a:t>
+            </a:r>
+            <a:r>
+              <a:rPr lang="en-US" dirty="0" smtClean="0"/>
+              <a:t>capacity decreases</a:t>
+            </a:r>
+            <a:endParaRPr lang="en-US" dirty="0" smtClean="0"/>
           </a:p>
           <a:p>
             <a:r>
@@ -4063,7 +4088,19 @@
           <a:p>
             <a:r>
               <a:rPr lang="en-US" dirty="0" smtClean="0"/>
-              <a:t>Understanding the critical points of an electrical supply network are crucial to its resiliency</a:t>
+              <a:t>Understanding where critical </a:t>
+            </a:r>
+            <a:r>
+              <a:rPr lang="en-US" dirty="0" smtClean="0"/>
+              <a:t>points of an electrical supply </a:t>
+            </a:r>
+            <a:r>
+              <a:rPr lang="en-US" dirty="0" smtClean="0"/>
+              <a:t>network are is </a:t>
+            </a:r>
+            <a:r>
+              <a:rPr lang="en-US" dirty="0" smtClean="0"/>
+              <a:t>crucial to its resiliency</a:t>
             </a:r>
           </a:p>
           <a:p>
@@ -4081,7 +4118,35 @@
           <a:p>
             <a:r>
               <a:rPr lang="en-US" dirty="0" smtClean="0"/>
-              <a:t>The model run with random capacities but same topology shows that network capacities design has a big impact on network’s resiliency</a:t>
+              <a:t>The model run with random capacities but same topology shows </a:t>
+            </a:r>
+            <a:r>
+              <a:rPr lang="en-US" dirty="0" smtClean="0"/>
+              <a:t>that the </a:t>
+            </a:r>
+            <a:r>
+              <a:rPr lang="en-US" smtClean="0"/>
+              <a:t>design of a </a:t>
+            </a:r>
+            <a:r>
+              <a:rPr lang="en-US" dirty="0" smtClean="0"/>
+              <a:t>network capacities </a:t>
+            </a:r>
+            <a:r>
+              <a:rPr lang="en-US" dirty="0" smtClean="0"/>
+              <a:t>has </a:t>
+            </a:r>
+            <a:r>
+              <a:rPr lang="en-US" dirty="0" smtClean="0"/>
+              <a:t>a big impact </a:t>
+            </a:r>
+            <a:r>
+              <a:rPr lang="en-US" smtClean="0"/>
+              <a:t>on the </a:t>
+            </a:r>
+            <a:r>
+              <a:rPr lang="en-US" dirty="0" smtClean="0"/>
+              <a:t>network’s resiliency</a:t>
             </a:r>
             <a:endParaRPr lang="en-US" dirty="0"/>
           </a:p>
@@ -4477,8 +4542,13 @@
           <a:p>
             <a:r>
               <a:rPr lang="en-US" dirty="0" smtClean="0"/>
-              <a:t>Environmental conditions could have significant impact</a:t>
-            </a:r>
+              <a:t>Environmental conditions could </a:t>
+            </a:r>
+            <a:r>
+              <a:rPr lang="en-US" dirty="0" smtClean="0"/>
+              <a:t>also compromise</a:t>
+            </a:r>
+            <a:endParaRPr lang="en-US" dirty="0" smtClean="0"/>
           </a:p>
           <a:p>
             <a:endParaRPr lang="en-US" dirty="0"/>
@@ -4889,13 +4959,22 @@
               <a:buAutoNum type="arabicPeriod"/>
             </a:pPr>
             <a:r>
+              <a:rPr lang="en-US" dirty="0" smtClean="0"/>
+              <a:t>Attempt load </a:t>
+            </a:r>
+            <a:r>
+              <a:rPr lang="en-US" dirty="0" smtClean="0"/>
+              <a:t>balancing </a:t>
+            </a:r>
+            <a:r>
+              <a:rPr lang="en-US" dirty="0" smtClean="0"/>
+              <a:t>again, see whether </a:t>
+            </a:r>
+            <a:r>
               <a:rPr lang="en-US" dirty="0" err="1" smtClean="0"/>
-              <a:t>Attemptload</a:t>
-            </a:r>
-            <a:r>
-              <a:rPr lang="en-US" dirty="0" smtClean="0"/>
-              <a:t> balancing again</a:t>
-            </a:r>
+              <a:t>balancable</a:t>
+            </a:r>
+            <a:endParaRPr lang="en-US" dirty="0" smtClean="0"/>
           </a:p>
           <a:p>
             <a:pPr marL="457200" indent="-457200">
@@ -5087,7 +5166,19 @@
           <a:p>
             <a:r>
               <a:rPr lang="en-US" dirty="0" smtClean="0"/>
-              <a:t>Each node can be theoretically discharged through connected edges</a:t>
+              <a:t>Ensure that </a:t>
+            </a:r>
+            <a:r>
+              <a:rPr lang="en-US" dirty="0"/>
+              <a:t>e</a:t>
+            </a:r>
+            <a:r>
+              <a:rPr lang="en-US" dirty="0" smtClean="0"/>
+              <a:t>ach </a:t>
+            </a:r>
+            <a:r>
+              <a:rPr lang="en-US" dirty="0" smtClean="0"/>
+              <a:t>node can be theoretically discharged through connected edges</a:t>
             </a:r>
             <a:endParaRPr lang="en-US" dirty="0"/>
           </a:p>
@@ -5248,7 +5339,15 @@
             <a:pPr lvl="1"/>
             <a:r>
               <a:rPr lang="en-US" dirty="0" smtClean="0"/>
-              <a:t>Satisfied means energy available to them at the moment greater than 0</a:t>
+              <a:t>Satisfied means energy available to them at the </a:t>
+            </a:r>
+            <a:r>
+              <a:rPr lang="en-US" dirty="0" smtClean="0"/>
+              <a:t>moment is </a:t>
+            </a:r>
+            <a:r>
+              <a:rPr lang="en-US" dirty="0" smtClean="0"/>
+              <a:t>greater than 0</a:t>
             </a:r>
           </a:p>
           <a:p>
@@ -5260,7 +5359,15 @@
           <a:p>
             <a:r>
               <a:rPr lang="en-US" dirty="0" smtClean="0"/>
-              <a:t>If there is no change in subsequent steps, or maximum change in a step is very small, we determine that the network cannot be balanced</a:t>
+              <a:t>If there is no </a:t>
+            </a:r>
+            <a:r>
+              <a:rPr lang="en-US" dirty="0" smtClean="0"/>
+              <a:t>change at all </a:t>
+            </a:r>
+            <a:r>
+              <a:rPr lang="en-US" dirty="0" smtClean="0"/>
+              <a:t>in subsequent steps, or maximum change in a step is very small, we determine that the network cannot be balanced</a:t>
             </a:r>
           </a:p>
           <a:p>
@@ -5640,7 +5747,19 @@
             </a:r>
             <a:r>
               <a:rPr lang="en-US" dirty="0" smtClean="0"/>
-              <a:t> nodes correspond to unsatisfied with not enough electricity supplied to them nodes</a:t>
+              <a:t> nodes correspond to </a:t>
+            </a:r>
+            <a:r>
+              <a:rPr lang="en-US" dirty="0" smtClean="0"/>
+              <a:t>unsatisfied nodes </a:t>
+            </a:r>
+            <a:r>
+              <a:rPr lang="en-US" dirty="0" smtClean="0"/>
+              <a:t>with not enough electricity supplied to </a:t>
+            </a:r>
+            <a:r>
+              <a:rPr lang="en-US" dirty="0" smtClean="0"/>
+              <a:t>them</a:t>
             </a:r>
             <a:endParaRPr lang="en-US" dirty="0"/>
           </a:p>
@@ -6077,7 +6196,7 @@
   <a:extraClrSchemeLst/>
   <a:extLst>
     <a:ext uri="{05A4C25C-085E-4340-85A3-A5531E510DB2}">
-      <thm15:themeFamily xmlns="" xmlns:thm15="http://schemas.microsoft.com/office/thememl/2012/main" name="FRS Vorlage.potx" id="{CE702807-FAE0-434A-A4D6-E8C8E87BB505}" vid="{509D41C6-7AF5-4EFD-B000-98EEE52CC6B2}"/>
+      <thm15:themeFamily xmlns:thm15="http://schemas.microsoft.com/office/thememl/2012/main" xmlns="" name="FRS Vorlage.potx" id="{CE702807-FAE0-434A-A4D6-E8C8E87BB505}" vid="{509D41C6-7AF5-4EFD-B000-98EEE52CC6B2}"/>
     </a:ext>
   </a:extLst>
 </a:theme>

</xml_diff>

<commit_message>
Going strong to results :P
</commit_message>
<xml_diff>
--- a/FinalPresentation.pptx
+++ b/FinalPresentation.pptx
@@ -3311,7 +3311,7 @@
           <a:graphicData uri="http://schemas.openxmlformats.org/presentationml/2006/ole">
             <mc:AlternateContent xmlns:mc="http://schemas.openxmlformats.org/markup-compatibility/2006">
               <mc:Choice xmlns:v="urn:schemas-microsoft-com:vml" Requires="v">
-                <p:oleObj spid="_x0000_s1088" name="Corel DESIGNER" r:id="rId15" imgW="6882717" imgH="1850040" progId="CorelDESIGNER.Graphic.16">
+                <p:oleObj spid="_x0000_s1089" name="Corel DESIGNER" r:id="rId15" imgW="6882717" imgH="1850040" progId="CorelDESIGNER.Graphic.16">
                   <p:embed/>
                 </p:oleObj>
               </mc:Choice>
@@ -4497,11 +4497,7 @@
             </a:r>
             <a:r>
               <a:rPr lang="en-US" dirty="0" smtClean="0"/>
-              <a:t>also </a:t>
-            </a:r>
-            <a:r>
-              <a:rPr lang="en-US" smtClean="0"/>
-              <a:t>result in a </a:t>
+              <a:t>also result in a </a:t>
             </a:r>
             <a:r>
               <a:rPr lang="en-US" dirty="0" smtClean="0"/>
@@ -5098,7 +5094,19 @@
           <a:p>
             <a:r>
               <a:rPr lang="en-US" dirty="0" smtClean="0"/>
-              <a:t>We use 1/40 nodes as energy producers and randomly assign the amount produced</a:t>
+              <a:t>We use </a:t>
+            </a:r>
+            <a:r>
+              <a:rPr lang="en-US" smtClean="0"/>
+              <a:t>1</a:t>
+            </a:r>
+            <a:r>
+              <a:rPr lang="en-US" smtClean="0"/>
+              <a:t>/30 </a:t>
+            </a:r>
+            <a:r>
+              <a:rPr lang="en-US" dirty="0" smtClean="0"/>
+              <a:t>nodes as energy producers and randomly assign the amount produced</a:t>
             </a:r>
           </a:p>
           <a:p>

</xml_diff>

<commit_message>
Presentation completed. Final version.
</commit_message>
<xml_diff>
--- a/FinalPresentation.pptx
+++ b/FinalPresentation.pptx
@@ -3311,7 +3311,7 @@
           <a:graphicData uri="http://schemas.openxmlformats.org/presentationml/2006/ole">
             <mc:AlternateContent xmlns:mc="http://schemas.openxmlformats.org/markup-compatibility/2006">
               <mc:Choice xmlns:v="urn:schemas-microsoft-com:vml" Requires="v">
-                <p:oleObj spid="_x0000_s1100" name="Corel DESIGNER" r:id="rId15" imgW="6882717" imgH="1850040" progId="CorelDESIGNER.Graphic.16">
+                <p:oleObj spid="_x0000_s1106" name="Corel DESIGNER" r:id="rId15" imgW="6882717" imgH="1850040" progId="CorelDESIGNER.Graphic.16">
                   <p:embed/>
                 </p:oleObj>
               </mc:Choice>
@@ -4507,11 +4507,11 @@
           <a:p>
             <a:r>
               <a:rPr lang="en-US" dirty="0" smtClean="0"/>
-              <a:t>Environmental conditions </a:t>
-            </a:r>
-            <a:r>
-              <a:rPr lang="en-US" dirty="0" smtClean="0"/>
-              <a:t>also result in a </a:t>
+              <a:t>Environmental </a:t>
+            </a:r>
+            <a:r>
+              <a:rPr lang="en-US" dirty="0" smtClean="0"/>
+              <a:t>conditions could also result in a </a:t>
             </a:r>
             <a:r>
               <a:rPr lang="en-US" dirty="0" smtClean="0"/>
@@ -4949,8 +4949,8 @@
               <a:t>Attempt load balancing again, see whether </a:t>
             </a:r>
             <a:r>
-              <a:rPr lang="en-US" dirty="0" err="1" smtClean="0"/>
-              <a:t>balancable</a:t>
+              <a:rPr lang="en-US" dirty="0" smtClean="0"/>
+              <a:t>balanceable</a:t>
             </a:r>
             <a:endParaRPr lang="en-US" dirty="0" smtClean="0"/>
           </a:p>

</xml_diff>

<commit_message>
Updated final presentation and report
</commit_message>
<xml_diff>
--- a/FinalPresentation.pptx
+++ b/FinalPresentation.pptx
@@ -3311,7 +3311,7 @@
           <a:graphicData uri="http://schemas.openxmlformats.org/presentationml/2006/ole">
             <mc:AlternateContent xmlns:mc="http://schemas.openxmlformats.org/markup-compatibility/2006">
               <mc:Choice xmlns:v="urn:schemas-microsoft-com:vml" Requires="v">
-                <p:oleObj spid="_x0000_s1106" name="Corel DESIGNER" r:id="rId15" imgW="6882717" imgH="1850040" progId="CorelDESIGNER.Graphic.16">
+                <p:oleObj spid="_x0000_s1110" name="Corel DESIGNER" r:id="rId15" imgW="6882717" imgH="1850040" progId="CorelDESIGNER.Graphic.16">
                   <p:embed/>
                 </p:oleObj>
               </mc:Choice>
@@ -4294,8 +4294,9 @@
             <a:pPr marL="722313" lvl="1" indent="-457200"/>
             <a:r>
               <a:rPr lang="en-US" dirty="0" smtClean="0"/>
-              <a:t>Network description</a:t>
-            </a:r>
+              <a:t>Populating network</a:t>
+            </a:r>
+            <a:endParaRPr lang="en-US" dirty="0" smtClean="0"/>
           </a:p>
           <a:p>
             <a:pPr marL="722313" lvl="1" indent="-457200"/>
@@ -5334,8 +5335,13 @@
             <a:pPr lvl="1"/>
             <a:r>
               <a:rPr lang="en-US" dirty="0" smtClean="0"/>
-              <a:t>Satisfied means energy available to them at the moment is greater than 0</a:t>
-            </a:r>
+              <a:t>Satisfied means energy available to them at the moment is </a:t>
+            </a:r>
+            <a:r>
+              <a:rPr lang="en-US" dirty="0" smtClean="0"/>
+              <a:t>non-negative</a:t>
+            </a:r>
+            <a:endParaRPr lang="en-US" dirty="0" smtClean="0"/>
           </a:p>
           <a:p>
             <a:r>

</xml_diff>